<commit_message>
szilvi login panel és bejelentkezés
</commit_message>
<xml_diff>
--- a/GKKprezentáció.pptx
+++ b/GKKprezentáció.pptx
@@ -5,13 +5,15 @@
     <p:sldMasterId id="2147483648" r:id="rId1"/>
   </p:sldMasterIdLst>
   <p:notesMasterIdLst>
-    <p:notesMasterId r:id="rId6"/>
+    <p:notesMasterId r:id="rId8"/>
   </p:notesMasterIdLst>
   <p:sldIdLst>
     <p:sldId id="256" r:id="rId2"/>
     <p:sldId id="257" r:id="rId3"/>
     <p:sldId id="259" r:id="rId4"/>
-    <p:sldId id="258" r:id="rId5"/>
+    <p:sldId id="260" r:id="rId5"/>
+    <p:sldId id="261" r:id="rId6"/>
+    <p:sldId id="258" r:id="rId7"/>
   </p:sldIdLst>
   <p:sldSz cx="12192000" cy="6858000"/>
   <p:notesSz cx="6858000" cy="9144000"/>
@@ -110,6 +112,11 @@
       </a:defRPr>
     </a:lvl9pPr>
   </p:defaultTextStyle>
+  <p:extLst>
+    <p:ext uri="{EFAFB233-063F-42B5-8137-9DF3F51BA10A}">
+      <p15:sldGuideLst xmlns:p15="http://schemas.microsoft.com/office/powerpoint/2012/main"/>
+    </p:ext>
+  </p:extLst>
 </p:presentation>
 </file>
 
@@ -195,7 +202,7 @@
           <a:p>
             <a:fld id="{6F41C697-146D-431A-B6C3-E781A5C42B97}" type="datetimeFigureOut">
               <a:rPr lang="hu-HU" smtClean="0"/>
-              <a:t>2023. 02. 15.</a:t>
+              <a:t>2023. 02. 21.</a:t>
             </a:fld>
             <a:endParaRPr lang="hu-HU"/>
           </a:p>
@@ -507,68 +514,6 @@
           <a:bodyPr/>
           <a:lstStyle/>
           <a:p>
-            <a:r>
-              <a:rPr lang="hu-HU" sz="1200" b="0" i="0" kern="1200" dirty="0" smtClean="0">
-                <a:solidFill>
-                  <a:schemeClr val="tx1"/>
-                </a:solidFill>
-                <a:effectLst/>
-                <a:latin typeface="+mn-lt"/>
-                <a:ea typeface="+mn-ea"/>
-                <a:cs typeface="+mn-cs"/>
-              </a:rPr>
-              <a:t>A mi projektünk célja, hogy a hétköznapi emberek számára könnyebbé és egyszerűbbé tegye a gépjármű bérlés lehetőségét, a cégek számára könnyebbé és átláthatóbbá tegye a gépjárművek nyilvántartását és a bérlések kezelését. </a:t>
-            </a:r>
-          </a:p>
-          <a:p>
-            <a:endParaRPr lang="hu-HU" sz="1200" b="0" i="0" kern="1200" dirty="0" smtClean="0">
-              <a:solidFill>
-                <a:schemeClr val="tx1"/>
-              </a:solidFill>
-              <a:effectLst/>
-              <a:latin typeface="+mn-lt"/>
-              <a:ea typeface="+mn-ea"/>
-              <a:cs typeface="+mn-cs"/>
-            </a:endParaRPr>
-          </a:p>
-          <a:p>
-            <a:r>
-              <a:rPr lang="hu-HU" sz="1200" b="0" i="0" kern="1200" dirty="0" smtClean="0">
-                <a:solidFill>
-                  <a:schemeClr val="tx1"/>
-                </a:solidFill>
-                <a:effectLst/>
-                <a:latin typeface="+mn-lt"/>
-                <a:ea typeface="+mn-ea"/>
-                <a:cs typeface="+mn-cs"/>
-              </a:rPr>
-              <a:t>Azért választottuk ezt a témát mivel érdeklődünk a személy-gépkocsik iránt. </a:t>
-            </a:r>
-          </a:p>
-          <a:p>
-            <a:endParaRPr lang="hu-HU" sz="1200" b="0" i="0" kern="1200" dirty="0" smtClean="0">
-              <a:solidFill>
-                <a:schemeClr val="tx1"/>
-              </a:solidFill>
-              <a:effectLst/>
-              <a:latin typeface="+mn-lt"/>
-              <a:ea typeface="+mn-ea"/>
-              <a:cs typeface="+mn-cs"/>
-            </a:endParaRPr>
-          </a:p>
-          <a:p>
-            <a:r>
-              <a:rPr lang="hu-HU" sz="1200" b="0" i="0" kern="1200" dirty="0" smtClean="0">
-                <a:solidFill>
-                  <a:schemeClr val="tx1"/>
-                </a:solidFill>
-                <a:effectLst/>
-                <a:latin typeface="+mn-lt"/>
-                <a:ea typeface="+mn-ea"/>
-                <a:cs typeface="+mn-cs"/>
-              </a:rPr>
-              <a:t>Korábbi autóbérlésünk során találkoztunk néhány nehézséggel, így szeretnénk megkönnyíteni a városba érkező turisták vagy helyiek, vagy környékbeliek közlekedési problémáit, egyúttal egy vállalkozás munkáját, ami bérbeadással foglalkozik.</a:t>
-            </a:r>
             <a:endParaRPr lang="hu-HU" dirty="0"/>
           </a:p>
         </p:txBody>
@@ -590,7 +535,7 @@
           <a:p>
             <a:fld id="{3C0E172F-5828-4ACE-8474-08765021FC61}" type="slidenum">
               <a:rPr lang="hu-HU" smtClean="0"/>
-              <a:t>2</a:t>
+              <a:t>1</a:t>
             </a:fld>
             <a:endParaRPr lang="hu-HU"/>
           </a:p>
@@ -599,7 +544,7 @@
     </p:spTree>
     <p:extLst>
       <p:ext uri="{BB962C8B-B14F-4D97-AF65-F5344CB8AC3E}">
-        <p14:creationId xmlns:p14="http://schemas.microsoft.com/office/powerpoint/2010/main" val="2820373320"/>
+        <p14:creationId xmlns:p14="http://schemas.microsoft.com/office/powerpoint/2010/main" val="13702084"/>
       </p:ext>
     </p:extLst>
   </p:cSld>
@@ -654,84 +599,66 @@
           <a:lstStyle/>
           <a:p>
             <a:r>
-              <a:rPr lang="hu-HU" dirty="0" smtClean="0"/>
-              <a:t>A </a:t>
-            </a:r>
-            <a:r>
-              <a:rPr lang="hu-HU" dirty="0" err="1" smtClean="0"/>
-              <a:t>html</a:t>
-            </a:r>
-            <a:r>
-              <a:rPr lang="hu-HU" dirty="0" smtClean="0"/>
-              <a:t>-el</a:t>
-            </a:r>
-            <a:r>
-              <a:rPr lang="hu-HU" baseline="0" dirty="0" smtClean="0"/>
-              <a:t> készítettük el a weboldal alapját, amelyet </a:t>
-            </a:r>
-            <a:r>
-              <a:rPr lang="hu-HU" baseline="0" dirty="0" err="1" smtClean="0"/>
-              <a:t>css</a:t>
-            </a:r>
-            <a:r>
-              <a:rPr lang="hu-HU" baseline="0" dirty="0" smtClean="0"/>
-              <a:t> segítségével formáztunk meg. </a:t>
-            </a:r>
-          </a:p>
-          <a:p>
-            <a:endParaRPr lang="hu-HU" baseline="0" dirty="0" smtClean="0"/>
-          </a:p>
-          <a:p>
-            <a:r>
-              <a:rPr lang="hu-HU" baseline="0" dirty="0" smtClean="0"/>
-              <a:t>A </a:t>
-            </a:r>
-            <a:r>
-              <a:rPr lang="hu-HU" baseline="0" dirty="0" err="1" smtClean="0"/>
-              <a:t>javascriptet</a:t>
-            </a:r>
-            <a:r>
-              <a:rPr lang="hu-HU" baseline="0" dirty="0" smtClean="0"/>
-              <a:t> is használtunk a weboldalhoz.</a:t>
-            </a:r>
-          </a:p>
-          <a:p>
-            <a:endParaRPr lang="hu-HU" baseline="0" dirty="0" smtClean="0"/>
-          </a:p>
-          <a:p>
-            <a:r>
-              <a:rPr lang="hu-HU" baseline="0" dirty="0" smtClean="0"/>
-              <a:t>A php-t használtuk a weboldal backend részének az elkészítéséhez.</a:t>
-            </a:r>
-          </a:p>
-          <a:p>
-            <a:endParaRPr lang="hu-HU" baseline="0" dirty="0" smtClean="0"/>
-          </a:p>
-          <a:p>
-            <a:r>
-              <a:rPr lang="hu-HU" baseline="0" dirty="0" smtClean="0"/>
-              <a:t>A </a:t>
-            </a:r>
-            <a:r>
-              <a:rPr lang="hu-HU" baseline="0" dirty="0" err="1" smtClean="0"/>
-              <a:t>mysql</a:t>
-            </a:r>
-            <a:r>
-              <a:rPr lang="hu-HU" baseline="0" dirty="0" smtClean="0"/>
-              <a:t>-t használja az alkalmazásunk adattárolásra.</a:t>
-            </a:r>
-          </a:p>
-          <a:p>
-            <a:endParaRPr lang="hu-HU" baseline="0" dirty="0" smtClean="0"/>
-          </a:p>
-          <a:p>
-            <a:r>
-              <a:rPr lang="hu-HU" baseline="0" smtClean="0"/>
-              <a:t>Java </a:t>
-            </a:r>
-            <a:r>
-              <a:rPr lang="hu-HU" baseline="0" dirty="0" smtClean="0"/>
-              <a:t>nyelven készítettük az asztali alkalmazásunkat. </a:t>
+              <a:rPr lang="hu-HU" sz="1200" b="0" i="0" kern="1200" dirty="0" smtClean="0">
+                <a:solidFill>
+                  <a:schemeClr val="tx1"/>
+                </a:solidFill>
+                <a:effectLst/>
+                <a:latin typeface="+mn-lt"/>
+                <a:ea typeface="+mn-ea"/>
+                <a:cs typeface="+mn-cs"/>
+              </a:rPr>
+              <a:t>A mi projektünk célja, hogy a hétköznapi emberek számára könnyebbé és egyszerűbbé tegye a gépjármű bérlés lehetőségét, a cégek számára könnyebbé és átláthatóbbá tegye a gépjárművek nyilvántartását és a bérlések kezelését. </a:t>
+            </a:r>
+          </a:p>
+          <a:p>
+            <a:endParaRPr lang="hu-HU" sz="1200" b="0" i="0" kern="1200" dirty="0" smtClean="0">
+              <a:solidFill>
+                <a:schemeClr val="tx1"/>
+              </a:solidFill>
+              <a:effectLst/>
+              <a:latin typeface="+mn-lt"/>
+              <a:ea typeface="+mn-ea"/>
+              <a:cs typeface="+mn-cs"/>
+            </a:endParaRPr>
+          </a:p>
+          <a:p>
+            <a:r>
+              <a:rPr lang="hu-HU" sz="1200" b="0" i="0" kern="1200" dirty="0" smtClean="0">
+                <a:solidFill>
+                  <a:schemeClr val="tx1"/>
+                </a:solidFill>
+                <a:effectLst/>
+                <a:latin typeface="+mn-lt"/>
+                <a:ea typeface="+mn-ea"/>
+                <a:cs typeface="+mn-cs"/>
+              </a:rPr>
+              <a:t>Azért választottuk ezt a témát mivel érdeklődünk a személy-gépkocsik iránt. </a:t>
+            </a:r>
+          </a:p>
+          <a:p>
+            <a:endParaRPr lang="hu-HU" sz="1200" b="0" i="0" kern="1200" dirty="0" smtClean="0">
+              <a:solidFill>
+                <a:schemeClr val="tx1"/>
+              </a:solidFill>
+              <a:effectLst/>
+              <a:latin typeface="+mn-lt"/>
+              <a:ea typeface="+mn-ea"/>
+              <a:cs typeface="+mn-cs"/>
+            </a:endParaRPr>
+          </a:p>
+          <a:p>
+            <a:r>
+              <a:rPr lang="hu-HU" sz="1200" b="0" i="0" kern="1200" dirty="0" smtClean="0">
+                <a:solidFill>
+                  <a:schemeClr val="tx1"/>
+                </a:solidFill>
+                <a:effectLst/>
+                <a:latin typeface="+mn-lt"/>
+                <a:ea typeface="+mn-ea"/>
+                <a:cs typeface="+mn-cs"/>
+              </a:rPr>
+              <a:t>Korábbi autóbérlésünk során találkoztunk néhány nehézséggel, így szeretnénk megkönnyíteni a városba érkező turisták vagy helyiek, vagy környékbeliek közlekedési problémáit, egyúttal egy vállalkozás munkáját, ami bérbeadással foglalkozik.</a:t>
             </a:r>
             <a:endParaRPr lang="hu-HU" dirty="0"/>
           </a:p>
@@ -754,6 +681,170 @@
           <a:p>
             <a:fld id="{3C0E172F-5828-4ACE-8474-08765021FC61}" type="slidenum">
               <a:rPr lang="hu-HU" smtClean="0"/>
+              <a:t>2</a:t>
+            </a:fld>
+            <a:endParaRPr lang="hu-HU"/>
+          </a:p>
+        </p:txBody>
+      </p:sp>
+    </p:spTree>
+    <p:extLst>
+      <p:ext uri="{BB962C8B-B14F-4D97-AF65-F5344CB8AC3E}">
+        <p14:creationId xmlns:p14="http://schemas.microsoft.com/office/powerpoint/2010/main" val="2820373320"/>
+      </p:ext>
+    </p:extLst>
+  </p:cSld>
+  <p:clrMapOvr>
+    <a:masterClrMapping/>
+  </p:clrMapOvr>
+</p:notes>
+</file>
+
+<file path=ppt/notesSlides/notesSlide3.xml><?xml version="1.0" encoding="utf-8"?>
+<p:notes xmlns:a="http://schemas.openxmlformats.org/drawingml/2006/main" xmlns:r="http://schemas.openxmlformats.org/officeDocument/2006/relationships" xmlns:p="http://schemas.openxmlformats.org/presentationml/2006/main">
+  <p:cSld>
+    <p:spTree>
+      <p:nvGrpSpPr>
+        <p:cNvPr id="1" name=""/>
+        <p:cNvGrpSpPr/>
+        <p:nvPr/>
+      </p:nvGrpSpPr>
+      <p:grpSpPr>
+        <a:xfrm>
+          <a:off x="0" y="0"/>
+          <a:ext cx="0" cy="0"/>
+          <a:chOff x="0" y="0"/>
+          <a:chExt cx="0" cy="0"/>
+        </a:xfrm>
+      </p:grpSpPr>
+      <p:sp>
+        <p:nvSpPr>
+          <p:cNvPr id="2" name="Diakép helye 1"/>
+          <p:cNvSpPr>
+            <a:spLocks noGrp="1" noRot="1" noChangeAspect="1"/>
+          </p:cNvSpPr>
+          <p:nvPr>
+            <p:ph type="sldImg"/>
+          </p:nvPr>
+        </p:nvSpPr>
+        <p:spPr/>
+      </p:sp>
+      <p:sp>
+        <p:nvSpPr>
+          <p:cNvPr id="3" name="Jegyzetek helye 2"/>
+          <p:cNvSpPr>
+            <a:spLocks noGrp="1"/>
+          </p:cNvSpPr>
+          <p:nvPr>
+            <p:ph type="body" idx="1"/>
+          </p:nvPr>
+        </p:nvSpPr>
+        <p:spPr/>
+        <p:txBody>
+          <a:bodyPr/>
+          <a:lstStyle/>
+          <a:p>
+            <a:r>
+              <a:rPr lang="hu-HU" dirty="0" smtClean="0"/>
+              <a:t>A </a:t>
+            </a:r>
+            <a:r>
+              <a:rPr lang="hu-HU" dirty="0" err="1" smtClean="0"/>
+              <a:t>html</a:t>
+            </a:r>
+            <a:r>
+              <a:rPr lang="hu-HU" dirty="0" smtClean="0"/>
+              <a:t>-el</a:t>
+            </a:r>
+            <a:r>
+              <a:rPr lang="hu-HU" baseline="0" dirty="0" smtClean="0"/>
+              <a:t> készítettük el a weboldal alapját, amelyet </a:t>
+            </a:r>
+            <a:r>
+              <a:rPr lang="hu-HU" baseline="0" dirty="0" err="1" smtClean="0"/>
+              <a:t>css</a:t>
+            </a:r>
+            <a:r>
+              <a:rPr lang="hu-HU" baseline="0" dirty="0" smtClean="0"/>
+              <a:t> segítségével formáztunk meg. </a:t>
+            </a:r>
+          </a:p>
+          <a:p>
+            <a:endParaRPr lang="hu-HU" baseline="0" dirty="0" smtClean="0"/>
+          </a:p>
+          <a:p>
+            <a:r>
+              <a:rPr lang="hu-HU" baseline="0" dirty="0" smtClean="0"/>
+              <a:t>A </a:t>
+            </a:r>
+            <a:r>
+              <a:rPr lang="hu-HU" baseline="0" dirty="0" err="1" smtClean="0"/>
+              <a:t>javascriptet</a:t>
+            </a:r>
+            <a:r>
+              <a:rPr lang="hu-HU" baseline="0" dirty="0" smtClean="0"/>
+              <a:t> is használtunk a weboldalhoz.</a:t>
+            </a:r>
+          </a:p>
+          <a:p>
+            <a:endParaRPr lang="hu-HU" baseline="0" dirty="0" smtClean="0"/>
+          </a:p>
+          <a:p>
+            <a:r>
+              <a:rPr lang="hu-HU" baseline="0" dirty="0" smtClean="0"/>
+              <a:t>A php-t használtuk a weboldal backend részének az elkészítéséhez.</a:t>
+            </a:r>
+          </a:p>
+          <a:p>
+            <a:endParaRPr lang="hu-HU" baseline="0" dirty="0" smtClean="0"/>
+          </a:p>
+          <a:p>
+            <a:r>
+              <a:rPr lang="hu-HU" baseline="0" dirty="0" smtClean="0"/>
+              <a:t>A </a:t>
+            </a:r>
+            <a:r>
+              <a:rPr lang="hu-HU" baseline="0" dirty="0" err="1" smtClean="0"/>
+              <a:t>mysql</a:t>
+            </a:r>
+            <a:r>
+              <a:rPr lang="hu-HU" baseline="0" dirty="0" smtClean="0"/>
+              <a:t>-t használja az alkalmazásunk adattárolásra.</a:t>
+            </a:r>
+          </a:p>
+          <a:p>
+            <a:endParaRPr lang="hu-HU" baseline="0" dirty="0" smtClean="0"/>
+          </a:p>
+          <a:p>
+            <a:r>
+              <a:rPr lang="hu-HU" baseline="0" smtClean="0"/>
+              <a:t>Java </a:t>
+            </a:r>
+            <a:r>
+              <a:rPr lang="hu-HU" baseline="0" dirty="0" smtClean="0"/>
+              <a:t>nyelven készítettük az asztali alkalmazásunkat. </a:t>
+            </a:r>
+            <a:endParaRPr lang="hu-HU" dirty="0"/>
+          </a:p>
+        </p:txBody>
+      </p:sp>
+      <p:sp>
+        <p:nvSpPr>
+          <p:cNvPr id="4" name="Dia számának helye 3"/>
+          <p:cNvSpPr>
+            <a:spLocks noGrp="1"/>
+          </p:cNvSpPr>
+          <p:nvPr>
+            <p:ph type="sldNum" sz="quarter" idx="10"/>
+          </p:nvPr>
+        </p:nvSpPr>
+        <p:spPr/>
+        <p:txBody>
+          <a:bodyPr/>
+          <a:lstStyle/>
+          <a:p>
+            <a:fld id="{3C0E172F-5828-4ACE-8474-08765021FC61}" type="slidenum">
+              <a:rPr lang="hu-HU" smtClean="0"/>
               <a:t>3</a:t>
             </a:fld>
             <a:endParaRPr lang="hu-HU"/>
@@ -764,6 +855,597 @@
     <p:extLst>
       <p:ext uri="{BB962C8B-B14F-4D97-AF65-F5344CB8AC3E}">
         <p14:creationId xmlns:p14="http://schemas.microsoft.com/office/powerpoint/2010/main" val="317234145"/>
+      </p:ext>
+    </p:extLst>
+  </p:cSld>
+  <p:clrMapOvr>
+    <a:masterClrMapping/>
+  </p:clrMapOvr>
+</p:notes>
+</file>
+
+<file path=ppt/notesSlides/notesSlide4.xml><?xml version="1.0" encoding="utf-8"?>
+<p:notes xmlns:a="http://schemas.openxmlformats.org/drawingml/2006/main" xmlns:r="http://schemas.openxmlformats.org/officeDocument/2006/relationships" xmlns:p="http://schemas.openxmlformats.org/presentationml/2006/main">
+  <p:cSld>
+    <p:spTree>
+      <p:nvGrpSpPr>
+        <p:cNvPr id="1" name=""/>
+        <p:cNvGrpSpPr/>
+        <p:nvPr/>
+      </p:nvGrpSpPr>
+      <p:grpSpPr>
+        <a:xfrm>
+          <a:off x="0" y="0"/>
+          <a:ext cx="0" cy="0"/>
+          <a:chOff x="0" y="0"/>
+          <a:chExt cx="0" cy="0"/>
+        </a:xfrm>
+      </p:grpSpPr>
+      <p:sp>
+        <p:nvSpPr>
+          <p:cNvPr id="2" name="Diakép helye 1"/>
+          <p:cNvSpPr>
+            <a:spLocks noGrp="1" noRot="1" noChangeAspect="1"/>
+          </p:cNvSpPr>
+          <p:nvPr>
+            <p:ph type="sldImg"/>
+          </p:nvPr>
+        </p:nvSpPr>
+        <p:spPr/>
+      </p:sp>
+      <p:sp>
+        <p:nvSpPr>
+          <p:cNvPr id="3" name="Jegyzetek helye 2"/>
+          <p:cNvSpPr>
+            <a:spLocks noGrp="1"/>
+          </p:cNvSpPr>
+          <p:nvPr>
+            <p:ph type="body" idx="1"/>
+          </p:nvPr>
+        </p:nvSpPr>
+        <p:spPr/>
+        <p:txBody>
+          <a:bodyPr/>
+          <a:lstStyle/>
+          <a:p>
+            <a:r>
+              <a:rPr lang="hu-HU" dirty="0" smtClean="0"/>
+              <a:t>Az adatbázisunk 4 táblából áll. A </a:t>
+            </a:r>
+            <a:r>
+              <a:rPr lang="hu-HU" dirty="0" err="1" smtClean="0"/>
+              <a:t>user</a:t>
+            </a:r>
+            <a:r>
+              <a:rPr lang="hu-HU" dirty="0" smtClean="0"/>
+              <a:t> táblában</a:t>
+            </a:r>
+            <a:r>
+              <a:rPr lang="hu-HU" baseline="0" dirty="0" smtClean="0"/>
+              <a:t> tároljuk a felhasználó adatait ami a regisztrációt követően kerül feltöltésre. A felhasználónak 3 darab rangja lehet: </a:t>
+            </a:r>
+            <a:r>
+              <a:rPr lang="hu-HU" baseline="0" dirty="0" err="1" smtClean="0"/>
+              <a:t>user</a:t>
+            </a:r>
+            <a:r>
+              <a:rPr lang="hu-HU" baseline="0" dirty="0" smtClean="0"/>
+              <a:t>, </a:t>
+            </a:r>
+            <a:r>
+              <a:rPr lang="hu-HU" baseline="0" dirty="0" err="1" smtClean="0"/>
+              <a:t>worker</a:t>
+            </a:r>
+            <a:r>
+              <a:rPr lang="hu-HU" baseline="0" dirty="0" smtClean="0"/>
+              <a:t>, </a:t>
+            </a:r>
+            <a:r>
+              <a:rPr lang="hu-HU" baseline="0" dirty="0" err="1" smtClean="0"/>
+              <a:t>admin</a:t>
+            </a:r>
+            <a:r>
+              <a:rPr lang="hu-HU" baseline="0" dirty="0" smtClean="0"/>
+              <a:t>  (Itt mond el mi van a táblában!)</a:t>
+            </a:r>
+          </a:p>
+          <a:p>
+            <a:r>
+              <a:rPr lang="hu-HU" baseline="0" dirty="0" smtClean="0"/>
+              <a:t> </a:t>
+            </a:r>
+          </a:p>
+          <a:p>
+            <a:pPr marL="0" marR="0" indent="0" algn="l" defTabSz="914400" rtl="0" eaLnBrk="1" fontAlgn="auto" latinLnBrk="0" hangingPunct="1">
+              <a:lnSpc>
+                <a:spcPct val="100000"/>
+              </a:lnSpc>
+              <a:spcBef>
+                <a:spcPts val="0"/>
+              </a:spcBef>
+              <a:spcAft>
+                <a:spcPts val="0"/>
+              </a:spcAft>
+              <a:buClrTx/>
+              <a:buSzTx/>
+              <a:buFontTx/>
+              <a:buNone/>
+              <a:tabLst/>
+              <a:defRPr/>
+            </a:pPr>
+            <a:r>
+              <a:rPr lang="hu-HU" baseline="0" dirty="0" smtClean="0"/>
+              <a:t>A vehicles táblában tároljuk a gépjárműveket és a gépjárműről egy fotót. Gépjárművet csak a Java alkalmazásból lehet feltölteni</a:t>
+            </a:r>
+            <a:r>
+              <a:rPr lang="hu-HU" baseline="0" dirty="0" smtClean="0"/>
+              <a:t> (Itt mond el mi van a táblában!)</a:t>
+            </a:r>
+          </a:p>
+          <a:p>
+            <a:pPr marL="0" marR="0" indent="0" algn="l" defTabSz="914400" rtl="0" eaLnBrk="1" fontAlgn="auto" latinLnBrk="0" hangingPunct="1">
+              <a:lnSpc>
+                <a:spcPct val="100000"/>
+              </a:lnSpc>
+              <a:spcBef>
+                <a:spcPts val="0"/>
+              </a:spcBef>
+              <a:spcAft>
+                <a:spcPts val="0"/>
+              </a:spcAft>
+              <a:buClrTx/>
+              <a:buSzTx/>
+              <a:buFontTx/>
+              <a:buNone/>
+              <a:tabLst/>
+              <a:defRPr/>
+            </a:pPr>
+            <a:endParaRPr lang="hu-HU" baseline="0" dirty="0" smtClean="0"/>
+          </a:p>
+          <a:p>
+            <a:pPr marL="0" marR="0" indent="0" algn="l" defTabSz="914400" rtl="0" eaLnBrk="1" fontAlgn="auto" latinLnBrk="0" hangingPunct="1">
+              <a:lnSpc>
+                <a:spcPct val="100000"/>
+              </a:lnSpc>
+              <a:spcBef>
+                <a:spcPts val="0"/>
+              </a:spcBef>
+              <a:spcAft>
+                <a:spcPts val="0"/>
+              </a:spcAft>
+              <a:buClrTx/>
+              <a:buSzTx/>
+              <a:buFontTx/>
+              <a:buNone/>
+              <a:tabLst/>
+              <a:defRPr/>
+            </a:pPr>
+            <a:r>
+              <a:rPr lang="hu-HU" baseline="0" dirty="0" smtClean="0"/>
+              <a:t>A booking táblában találhatóak a gépjármű foglalások. (Itt mond el mi van a táblában!)</a:t>
+            </a:r>
+          </a:p>
+          <a:p>
+            <a:pPr marL="0" marR="0" indent="0" algn="l" defTabSz="914400" rtl="0" eaLnBrk="1" fontAlgn="auto" latinLnBrk="0" hangingPunct="1">
+              <a:lnSpc>
+                <a:spcPct val="100000"/>
+              </a:lnSpc>
+              <a:spcBef>
+                <a:spcPts val="0"/>
+              </a:spcBef>
+              <a:spcAft>
+                <a:spcPts val="0"/>
+              </a:spcAft>
+              <a:buClrTx/>
+              <a:buSzTx/>
+              <a:buFontTx/>
+              <a:buNone/>
+              <a:tabLst/>
+              <a:defRPr/>
+            </a:pPr>
+            <a:endParaRPr lang="hu-HU" baseline="0" dirty="0" smtClean="0"/>
+          </a:p>
+          <a:p>
+            <a:pPr marL="0" marR="0" indent="0" algn="l" defTabSz="914400" rtl="0" eaLnBrk="1" fontAlgn="auto" latinLnBrk="0" hangingPunct="1">
+              <a:lnSpc>
+                <a:spcPct val="100000"/>
+              </a:lnSpc>
+              <a:spcBef>
+                <a:spcPts val="0"/>
+              </a:spcBef>
+              <a:spcAft>
+                <a:spcPts val="0"/>
+              </a:spcAft>
+              <a:buClrTx/>
+              <a:buSzTx/>
+              <a:buFontTx/>
+              <a:buNone/>
+              <a:tabLst/>
+              <a:defRPr/>
+            </a:pPr>
+            <a:r>
+              <a:rPr lang="hu-HU" baseline="0" dirty="0" smtClean="0"/>
+              <a:t>A java alkalmazásban a dolgozó jogosultságú tud küldeni üzenetet </a:t>
+            </a:r>
+            <a:r>
+              <a:rPr lang="hu-HU" baseline="0" dirty="0" err="1" smtClean="0"/>
+              <a:t>adminnak</a:t>
+            </a:r>
+            <a:r>
+              <a:rPr lang="hu-HU" baseline="0" dirty="0" smtClean="0"/>
+              <a:t> és ezeket az üzeneteket a </a:t>
+            </a:r>
+            <a:r>
+              <a:rPr lang="hu-HU" baseline="0" dirty="0" err="1" smtClean="0"/>
+              <a:t>message</a:t>
+            </a:r>
+            <a:r>
+              <a:rPr lang="hu-HU" baseline="0" dirty="0" smtClean="0"/>
+              <a:t> táblában tároljuk el. (Itt mond el mi van a táblában!)</a:t>
+            </a:r>
+          </a:p>
+          <a:p>
+            <a:pPr marL="0" marR="0" indent="0" algn="l" defTabSz="914400" rtl="0" eaLnBrk="1" fontAlgn="auto" latinLnBrk="0" hangingPunct="1">
+              <a:lnSpc>
+                <a:spcPct val="100000"/>
+              </a:lnSpc>
+              <a:spcBef>
+                <a:spcPts val="0"/>
+              </a:spcBef>
+              <a:spcAft>
+                <a:spcPts val="0"/>
+              </a:spcAft>
+              <a:buClrTx/>
+              <a:buSzTx/>
+              <a:buFontTx/>
+              <a:buNone/>
+              <a:tabLst/>
+              <a:defRPr/>
+            </a:pPr>
+            <a:endParaRPr lang="hu-HU" baseline="0" dirty="0" smtClean="0"/>
+          </a:p>
+          <a:p>
+            <a:pPr marL="0" marR="0" indent="0" algn="l" defTabSz="914400" rtl="0" eaLnBrk="1" fontAlgn="auto" latinLnBrk="0" hangingPunct="1">
+              <a:lnSpc>
+                <a:spcPct val="100000"/>
+              </a:lnSpc>
+              <a:spcBef>
+                <a:spcPts val="0"/>
+              </a:spcBef>
+              <a:spcAft>
+                <a:spcPts val="0"/>
+              </a:spcAft>
+              <a:buClrTx/>
+              <a:buSzTx/>
+              <a:buFontTx/>
+              <a:buNone/>
+              <a:tabLst/>
+              <a:defRPr/>
+            </a:pPr>
+            <a:r>
+              <a:rPr lang="hu-HU" baseline="0" dirty="0" smtClean="0"/>
+              <a:t>A </a:t>
+            </a:r>
+            <a:r>
+              <a:rPr lang="hu-HU" baseline="0" dirty="0" err="1" smtClean="0"/>
+              <a:t>user</a:t>
+            </a:r>
+            <a:r>
+              <a:rPr lang="hu-HU" baseline="0" dirty="0" smtClean="0"/>
+              <a:t> táblában lévő </a:t>
+            </a:r>
+            <a:r>
+              <a:rPr lang="hu-HU" baseline="0" dirty="0" err="1" smtClean="0"/>
+              <a:t>id</a:t>
+            </a:r>
+            <a:r>
+              <a:rPr lang="hu-HU" baseline="0" dirty="0" smtClean="0"/>
+              <a:t> csatlakozik a </a:t>
+            </a:r>
+            <a:r>
+              <a:rPr lang="hu-HU" baseline="0" dirty="0" err="1" smtClean="0"/>
+              <a:t>bookings</a:t>
+            </a:r>
+            <a:r>
+              <a:rPr lang="hu-HU" baseline="0" dirty="0" smtClean="0"/>
+              <a:t> táblához mert így tudjuk beazonosítani hogy a felhasználó mikorra bérelt gépjárművet.</a:t>
+            </a:r>
+          </a:p>
+          <a:p>
+            <a:pPr marL="0" marR="0" indent="0" algn="l" defTabSz="914400" rtl="0" eaLnBrk="1" fontAlgn="auto" latinLnBrk="0" hangingPunct="1">
+              <a:lnSpc>
+                <a:spcPct val="100000"/>
+              </a:lnSpc>
+              <a:spcBef>
+                <a:spcPts val="0"/>
+              </a:spcBef>
+              <a:spcAft>
+                <a:spcPts val="0"/>
+              </a:spcAft>
+              <a:buClrTx/>
+              <a:buSzTx/>
+              <a:buFontTx/>
+              <a:buNone/>
+              <a:tabLst/>
+              <a:defRPr/>
+            </a:pPr>
+            <a:endParaRPr lang="hu-HU" baseline="0" dirty="0" smtClean="0"/>
+          </a:p>
+          <a:p>
+            <a:pPr marL="0" marR="0" indent="0" algn="l" defTabSz="914400" rtl="0" eaLnBrk="1" fontAlgn="auto" latinLnBrk="0" hangingPunct="1">
+              <a:lnSpc>
+                <a:spcPct val="100000"/>
+              </a:lnSpc>
+              <a:spcBef>
+                <a:spcPts val="0"/>
+              </a:spcBef>
+              <a:spcAft>
+                <a:spcPts val="0"/>
+              </a:spcAft>
+              <a:buClrTx/>
+              <a:buSzTx/>
+              <a:buFontTx/>
+              <a:buNone/>
+              <a:tabLst/>
+              <a:defRPr/>
+            </a:pPr>
+            <a:r>
+              <a:rPr lang="hu-HU" baseline="0" dirty="0" smtClean="0"/>
+              <a:t>A booking táblához csatlakozik a </a:t>
+            </a:r>
+            <a:r>
+              <a:rPr lang="hu-HU" baseline="0" dirty="0" err="1" smtClean="0"/>
+              <a:t>vehicle</a:t>
+            </a:r>
+            <a:r>
+              <a:rPr lang="hu-HU" baseline="0" dirty="0" smtClean="0"/>
+              <a:t> </a:t>
+            </a:r>
+            <a:r>
+              <a:rPr lang="hu-HU" baseline="0" dirty="0" err="1" smtClean="0"/>
+              <a:t>id</a:t>
+            </a:r>
+            <a:r>
+              <a:rPr lang="hu-HU" baseline="0" dirty="0" smtClean="0"/>
+              <a:t> is ezzel azt tudjuk ellenőrizni hogy a felhasználó melyik járművet foglalta le</a:t>
+            </a:r>
+          </a:p>
+          <a:p>
+            <a:pPr marL="0" marR="0" indent="0" algn="l" defTabSz="914400" rtl="0" eaLnBrk="1" fontAlgn="auto" latinLnBrk="0" hangingPunct="1">
+              <a:lnSpc>
+                <a:spcPct val="100000"/>
+              </a:lnSpc>
+              <a:spcBef>
+                <a:spcPts val="0"/>
+              </a:spcBef>
+              <a:spcAft>
+                <a:spcPts val="0"/>
+              </a:spcAft>
+              <a:buClrTx/>
+              <a:buSzTx/>
+              <a:buFontTx/>
+              <a:buNone/>
+              <a:tabLst/>
+              <a:defRPr/>
+            </a:pPr>
+            <a:endParaRPr lang="hu-HU" baseline="0" dirty="0" smtClean="0"/>
+          </a:p>
+          <a:p>
+            <a:pPr marL="0" marR="0" indent="0" algn="l" defTabSz="914400" rtl="0" eaLnBrk="1" fontAlgn="auto" latinLnBrk="0" hangingPunct="1">
+              <a:lnSpc>
+                <a:spcPct val="100000"/>
+              </a:lnSpc>
+              <a:spcBef>
+                <a:spcPts val="0"/>
+              </a:spcBef>
+              <a:spcAft>
+                <a:spcPts val="0"/>
+              </a:spcAft>
+              <a:buClrTx/>
+              <a:buSzTx/>
+              <a:buFontTx/>
+              <a:buNone/>
+              <a:tabLst/>
+              <a:defRPr/>
+            </a:pPr>
+            <a:r>
+              <a:rPr lang="hu-HU" baseline="0" dirty="0" smtClean="0"/>
+              <a:t>A </a:t>
+            </a:r>
+            <a:r>
+              <a:rPr lang="hu-HU" baseline="0" dirty="0" err="1" smtClean="0"/>
+              <a:t>user</a:t>
+            </a:r>
+            <a:r>
+              <a:rPr lang="hu-HU" baseline="0" dirty="0" smtClean="0"/>
+              <a:t> táblában a </a:t>
+            </a:r>
+            <a:r>
+              <a:rPr lang="hu-HU" baseline="0" dirty="0" err="1" smtClean="0"/>
+              <a:t>username</a:t>
+            </a:r>
+            <a:r>
+              <a:rPr lang="hu-HU" baseline="0" dirty="0" smtClean="0"/>
+              <a:t> csatlakozik a </a:t>
+            </a:r>
+            <a:r>
+              <a:rPr lang="hu-HU" baseline="0" dirty="0" err="1" smtClean="0"/>
+              <a:t>message</a:t>
+            </a:r>
+            <a:r>
+              <a:rPr lang="hu-HU" baseline="0" dirty="0" smtClean="0"/>
+              <a:t> táblához és ezzel fogja tudni beazonosítani az </a:t>
+            </a:r>
+            <a:r>
+              <a:rPr lang="hu-HU" baseline="0" dirty="0" err="1" smtClean="0"/>
+              <a:t>admin</a:t>
+            </a:r>
+            <a:r>
+              <a:rPr lang="hu-HU" baseline="0" dirty="0" smtClean="0"/>
+              <a:t> hogy ki küldte az üzenet.</a:t>
+            </a:r>
+          </a:p>
+          <a:p>
+            <a:endParaRPr lang="hu-HU" dirty="0"/>
+          </a:p>
+        </p:txBody>
+      </p:sp>
+      <p:sp>
+        <p:nvSpPr>
+          <p:cNvPr id="4" name="Dia számának helye 3"/>
+          <p:cNvSpPr>
+            <a:spLocks noGrp="1"/>
+          </p:cNvSpPr>
+          <p:nvPr>
+            <p:ph type="sldNum" sz="quarter" idx="10"/>
+          </p:nvPr>
+        </p:nvSpPr>
+        <p:spPr/>
+        <p:txBody>
+          <a:bodyPr/>
+          <a:lstStyle/>
+          <a:p>
+            <a:fld id="{3C0E172F-5828-4ACE-8474-08765021FC61}" type="slidenum">
+              <a:rPr lang="hu-HU" smtClean="0"/>
+              <a:t>4</a:t>
+            </a:fld>
+            <a:endParaRPr lang="hu-HU"/>
+          </a:p>
+        </p:txBody>
+      </p:sp>
+    </p:spTree>
+    <p:extLst>
+      <p:ext uri="{BB962C8B-B14F-4D97-AF65-F5344CB8AC3E}">
+        <p14:creationId xmlns:p14="http://schemas.microsoft.com/office/powerpoint/2010/main" val="1772684953"/>
+      </p:ext>
+    </p:extLst>
+  </p:cSld>
+  <p:clrMapOvr>
+    <a:masterClrMapping/>
+  </p:clrMapOvr>
+</p:notes>
+</file>
+
+<file path=ppt/notesSlides/notesSlide5.xml><?xml version="1.0" encoding="utf-8"?>
+<p:notes xmlns:a="http://schemas.openxmlformats.org/drawingml/2006/main" xmlns:r="http://schemas.openxmlformats.org/officeDocument/2006/relationships" xmlns:p="http://schemas.openxmlformats.org/presentationml/2006/main">
+  <p:cSld>
+    <p:spTree>
+      <p:nvGrpSpPr>
+        <p:cNvPr id="1" name=""/>
+        <p:cNvGrpSpPr/>
+        <p:nvPr/>
+      </p:nvGrpSpPr>
+      <p:grpSpPr>
+        <a:xfrm>
+          <a:off x="0" y="0"/>
+          <a:ext cx="0" cy="0"/>
+          <a:chOff x="0" y="0"/>
+          <a:chExt cx="0" cy="0"/>
+        </a:xfrm>
+      </p:grpSpPr>
+      <p:sp>
+        <p:nvSpPr>
+          <p:cNvPr id="2" name="Diakép helye 1"/>
+          <p:cNvSpPr>
+            <a:spLocks noGrp="1" noRot="1" noChangeAspect="1"/>
+          </p:cNvSpPr>
+          <p:nvPr>
+            <p:ph type="sldImg"/>
+          </p:nvPr>
+        </p:nvSpPr>
+        <p:spPr/>
+      </p:sp>
+      <p:sp>
+        <p:nvSpPr>
+          <p:cNvPr id="3" name="Jegyzetek helye 2"/>
+          <p:cNvSpPr>
+            <a:spLocks noGrp="1"/>
+          </p:cNvSpPr>
+          <p:nvPr>
+            <p:ph type="body" idx="1"/>
+          </p:nvPr>
+        </p:nvSpPr>
+        <p:spPr/>
+        <p:txBody>
+          <a:bodyPr/>
+          <a:lstStyle/>
+          <a:p>
+            <a:r>
+              <a:rPr lang="hu-HU" dirty="0" smtClean="0"/>
+              <a:t>A webalkalmazáson</a:t>
+            </a:r>
+            <a:r>
+              <a:rPr lang="hu-HU" baseline="0" dirty="0" smtClean="0"/>
+              <a:t> keresztül tud gépjárművet foglalni és lemondani azt és a saját profilját kezelni</a:t>
+            </a:r>
+            <a:r>
+              <a:rPr lang="hu-HU" dirty="0" smtClean="0"/>
+              <a:t>. Webalkalmazásba</a:t>
+            </a:r>
+            <a:r>
+              <a:rPr lang="hu-HU" baseline="0" dirty="0" smtClean="0"/>
+              <a:t> bárki tud fiókot létrehozni </a:t>
+            </a:r>
+            <a:r>
+              <a:rPr lang="hu-HU" baseline="0" dirty="0" err="1" smtClean="0"/>
+              <a:t>user</a:t>
+            </a:r>
+            <a:r>
+              <a:rPr lang="hu-HU" baseline="0" dirty="0" smtClean="0"/>
+              <a:t> jogosultsággal.</a:t>
+            </a:r>
+          </a:p>
+          <a:p>
+            <a:endParaRPr lang="hu-HU" baseline="0" dirty="0" smtClean="0"/>
+          </a:p>
+          <a:p>
+            <a:r>
+              <a:rPr lang="hu-HU" baseline="0" dirty="0" smtClean="0"/>
+              <a:t>A java alkalmazás a dolgozók számára jött létre mivel itt tudják elvégezni az adminisztrációs  folyamatokat. Itt nem lehet fiókot regisztrálni , Regisztrálni mindenféleképpen a webalkalmazásban kell . Aki </a:t>
+            </a:r>
+            <a:r>
+              <a:rPr lang="hu-HU" baseline="0" dirty="0" err="1" smtClean="0"/>
+              <a:t>admin</a:t>
+            </a:r>
+            <a:r>
+              <a:rPr lang="hu-HU" baseline="0" dirty="0" smtClean="0"/>
+              <a:t> jogosultsággal rendelkezik az tudja kezelni a felhasználókat illetve </a:t>
+            </a:r>
+            <a:r>
+              <a:rPr lang="hu-HU" baseline="0" smtClean="0"/>
+              <a:t>az üzeneteket.</a:t>
+            </a:r>
+            <a:endParaRPr lang="hu-HU" dirty="0"/>
+          </a:p>
+        </p:txBody>
+      </p:sp>
+      <p:sp>
+        <p:nvSpPr>
+          <p:cNvPr id="4" name="Dia számának helye 3"/>
+          <p:cNvSpPr>
+            <a:spLocks noGrp="1"/>
+          </p:cNvSpPr>
+          <p:nvPr>
+            <p:ph type="sldNum" sz="quarter" idx="10"/>
+          </p:nvPr>
+        </p:nvSpPr>
+        <p:spPr/>
+        <p:txBody>
+          <a:bodyPr/>
+          <a:lstStyle/>
+          <a:p>
+            <a:fld id="{3C0E172F-5828-4ACE-8474-08765021FC61}" type="slidenum">
+              <a:rPr lang="hu-HU" smtClean="0"/>
+              <a:t>5</a:t>
+            </a:fld>
+            <a:endParaRPr lang="hu-HU"/>
+          </a:p>
+        </p:txBody>
+      </p:sp>
+    </p:spTree>
+    <p:extLst>
+      <p:ext uri="{BB962C8B-B14F-4D97-AF65-F5344CB8AC3E}">
+        <p14:creationId xmlns:p14="http://schemas.microsoft.com/office/powerpoint/2010/main" val="3044153648"/>
       </p:ext>
     </p:extLst>
   </p:cSld>
@@ -823,7 +1505,7 @@
           <a:noFill/>
           <a:extLst>
             <a:ext uri="{909E8E84-426E-40dd-AFC4-6F175D3DCCD1}">
-              <a14:hiddenFill xmlns:a14="http://schemas.microsoft.com/office/drawing/2010/main" xmlns="">
+              <a14:hiddenFill xmlns="" xmlns:a14="http://schemas.microsoft.com/office/drawing/2010/main">
                 <a:solidFill>
                   <a:srgbClr val="FFFFFF"/>
                 </a:solidFill>
@@ -883,7 +1565,7 @@
             </a:ln>
             <a:extLst>
               <a:ext uri="{91240B29-F687-4f45-9708-019B960494DF}">
-                <a14:hiddenLine xmlns:a14="http://schemas.microsoft.com/office/drawing/2010/main" xmlns="" w="9525">
+                <a14:hiddenLine xmlns="" xmlns:a14="http://schemas.microsoft.com/office/drawing/2010/main" w="9525">
                   <a:solidFill>
                     <a:srgbClr val="000000"/>
                   </a:solidFill>
@@ -973,7 +1655,7 @@
             </a:ln>
             <a:extLst>
               <a:ext uri="{91240B29-F687-4f45-9708-019B960494DF}">
-                <a14:hiddenLine xmlns:a14="http://schemas.microsoft.com/office/drawing/2010/main" xmlns="" w="9525">
+                <a14:hiddenLine xmlns="" xmlns:a14="http://schemas.microsoft.com/office/drawing/2010/main" w="9525">
                   <a:solidFill>
                     <a:srgbClr val="000000"/>
                   </a:solidFill>
@@ -1063,7 +1745,7 @@
             </a:ln>
             <a:extLst>
               <a:ext uri="{91240B29-F687-4f45-9708-019B960494DF}">
-                <a14:hiddenLine xmlns:a14="http://schemas.microsoft.com/office/drawing/2010/main" xmlns="" w="9525">
+                <a14:hiddenLine xmlns="" xmlns:a14="http://schemas.microsoft.com/office/drawing/2010/main" w="9525">
                   <a:solidFill>
                     <a:srgbClr val="000000"/>
                   </a:solidFill>
@@ -1097,7 +1779,7 @@
             </a:ln>
             <a:extLst>
               <a:ext uri="{91240B29-F687-4f45-9708-019B960494DF}">
-                <a14:hiddenLine xmlns:a14="http://schemas.microsoft.com/office/drawing/2010/main" xmlns="" w="9525">
+                <a14:hiddenLine xmlns="" xmlns:a14="http://schemas.microsoft.com/office/drawing/2010/main" w="9525">
                   <a:solidFill>
                     <a:srgbClr val="000000"/>
                   </a:solidFill>
@@ -1187,7 +1869,7 @@
             </a:ln>
             <a:extLst>
               <a:ext uri="{91240B29-F687-4f45-9708-019B960494DF}">
-                <a14:hiddenLine xmlns:a14="http://schemas.microsoft.com/office/drawing/2010/main" xmlns="" w="9525">
+                <a14:hiddenLine xmlns="" xmlns:a14="http://schemas.microsoft.com/office/drawing/2010/main" w="9525">
                   <a:solidFill>
                     <a:srgbClr val="000000"/>
                   </a:solidFill>
@@ -1249,7 +1931,7 @@
             </a:ln>
             <a:extLst>
               <a:ext uri="{91240B29-F687-4f45-9708-019B960494DF}">
-                <a14:hiddenLine xmlns:a14="http://schemas.microsoft.com/office/drawing/2010/main" xmlns="" w="9525">
+                <a14:hiddenLine xmlns="" xmlns:a14="http://schemas.microsoft.com/office/drawing/2010/main" w="9525">
                   <a:solidFill>
                     <a:srgbClr val="000000"/>
                   </a:solidFill>
@@ -1311,7 +1993,7 @@
             </a:ln>
             <a:extLst>
               <a:ext uri="{91240B29-F687-4f45-9708-019B960494DF}">
-                <a14:hiddenLine xmlns:a14="http://schemas.microsoft.com/office/drawing/2010/main" xmlns="" w="9525">
+                <a14:hiddenLine xmlns="" xmlns:a14="http://schemas.microsoft.com/office/drawing/2010/main" w="9525">
                   <a:solidFill>
                     <a:srgbClr val="000000"/>
                   </a:solidFill>
@@ -1401,7 +2083,7 @@
             </a:ln>
             <a:extLst>
               <a:ext uri="{91240B29-F687-4f45-9708-019B960494DF}">
-                <a14:hiddenLine xmlns:a14="http://schemas.microsoft.com/office/drawing/2010/main" xmlns="" w="9525">
+                <a14:hiddenLine xmlns="" xmlns:a14="http://schemas.microsoft.com/office/drawing/2010/main" w="9525">
                   <a:solidFill>
                     <a:srgbClr val="000000"/>
                   </a:solidFill>
@@ -1463,7 +2145,7 @@
             </a:ln>
             <a:extLst>
               <a:ext uri="{91240B29-F687-4f45-9708-019B960494DF}">
-                <a14:hiddenLine xmlns:a14="http://schemas.microsoft.com/office/drawing/2010/main" xmlns="" w="9525">
+                <a14:hiddenLine xmlns="" xmlns:a14="http://schemas.microsoft.com/office/drawing/2010/main" w="9525">
                   <a:solidFill>
                     <a:srgbClr val="000000"/>
                   </a:solidFill>
@@ -1525,7 +2207,7 @@
             </a:ln>
             <a:extLst>
               <a:ext uri="{91240B29-F687-4f45-9708-019B960494DF}">
-                <a14:hiddenLine xmlns:a14="http://schemas.microsoft.com/office/drawing/2010/main" xmlns="" w="9525">
+                <a14:hiddenLine xmlns="" xmlns:a14="http://schemas.microsoft.com/office/drawing/2010/main" w="9525">
                   <a:solidFill>
                     <a:srgbClr val="000000"/>
                   </a:solidFill>
@@ -1615,7 +2297,7 @@
             </a:ln>
             <a:extLst>
               <a:ext uri="{91240B29-F687-4f45-9708-019B960494DF}">
-                <a14:hiddenLine xmlns:a14="http://schemas.microsoft.com/office/drawing/2010/main" xmlns="" w="9525">
+                <a14:hiddenLine xmlns="" xmlns:a14="http://schemas.microsoft.com/office/drawing/2010/main" w="9525">
                   <a:solidFill>
                     <a:srgbClr val="000000"/>
                   </a:solidFill>
@@ -1705,7 +2387,7 @@
             </a:ln>
             <a:extLst>
               <a:ext uri="{91240B29-F687-4f45-9708-019B960494DF}">
-                <a14:hiddenLine xmlns:a14="http://schemas.microsoft.com/office/drawing/2010/main" xmlns="" w="9525">
+                <a14:hiddenLine xmlns="" xmlns:a14="http://schemas.microsoft.com/office/drawing/2010/main" w="9525">
                   <a:solidFill>
                     <a:srgbClr val="000000"/>
                   </a:solidFill>
@@ -1767,7 +2449,7 @@
             </a:ln>
             <a:extLst>
               <a:ext uri="{91240B29-F687-4f45-9708-019B960494DF}">
-                <a14:hiddenLine xmlns:a14="http://schemas.microsoft.com/office/drawing/2010/main" xmlns="" w="9525">
+                <a14:hiddenLine xmlns="" xmlns:a14="http://schemas.microsoft.com/office/drawing/2010/main" w="9525">
                   <a:solidFill>
                     <a:srgbClr val="000000"/>
                   </a:solidFill>
@@ -1877,7 +2559,7 @@
             </a:ln>
             <a:extLst>
               <a:ext uri="{91240B29-F687-4f45-9708-019B960494DF}">
-                <a14:hiddenLine xmlns:a14="http://schemas.microsoft.com/office/drawing/2010/main" xmlns="" w="9525">
+                <a14:hiddenLine xmlns="" xmlns:a14="http://schemas.microsoft.com/office/drawing/2010/main" w="9525">
                   <a:solidFill>
                     <a:srgbClr val="000000"/>
                   </a:solidFill>
@@ -1939,7 +2621,7 @@
             </a:ln>
             <a:extLst>
               <a:ext uri="{91240B29-F687-4f45-9708-019B960494DF}">
-                <a14:hiddenLine xmlns:a14="http://schemas.microsoft.com/office/drawing/2010/main" xmlns="" w="9525">
+                <a14:hiddenLine xmlns="" xmlns:a14="http://schemas.microsoft.com/office/drawing/2010/main" w="9525">
                   <a:solidFill>
                     <a:srgbClr val="000000"/>
                   </a:solidFill>
@@ -2029,7 +2711,7 @@
             </a:ln>
             <a:extLst>
               <a:ext uri="{91240B29-F687-4f45-9708-019B960494DF}">
-                <a14:hiddenLine xmlns:a14="http://schemas.microsoft.com/office/drawing/2010/main" xmlns="" w="9525">
+                <a14:hiddenLine xmlns="" xmlns:a14="http://schemas.microsoft.com/office/drawing/2010/main" w="9525">
                   <a:solidFill>
                     <a:srgbClr val="000000"/>
                   </a:solidFill>
@@ -2119,7 +2801,7 @@
             </a:ln>
             <a:extLst>
               <a:ext uri="{91240B29-F687-4f45-9708-019B960494DF}">
-                <a14:hiddenLine xmlns:a14="http://schemas.microsoft.com/office/drawing/2010/main" xmlns="" w="9525">
+                <a14:hiddenLine xmlns="" xmlns:a14="http://schemas.microsoft.com/office/drawing/2010/main" w="9525">
                   <a:solidFill>
                     <a:srgbClr val="000000"/>
                   </a:solidFill>
@@ -2181,7 +2863,7 @@
             </a:ln>
             <a:extLst>
               <a:ext uri="{91240B29-F687-4f45-9708-019B960494DF}">
-                <a14:hiddenLine xmlns:a14="http://schemas.microsoft.com/office/drawing/2010/main" xmlns="" w="9525">
+                <a14:hiddenLine xmlns="" xmlns:a14="http://schemas.microsoft.com/office/drawing/2010/main" w="9525">
                   <a:solidFill>
                     <a:srgbClr val="000000"/>
                   </a:solidFill>
@@ -2271,7 +2953,7 @@
             </a:ln>
             <a:extLst>
               <a:ext uri="{91240B29-F687-4f45-9708-019B960494DF}">
-                <a14:hiddenLine xmlns:a14="http://schemas.microsoft.com/office/drawing/2010/main" xmlns="" w="9525">
+                <a14:hiddenLine xmlns="" xmlns:a14="http://schemas.microsoft.com/office/drawing/2010/main" w="9525">
                   <a:solidFill>
                     <a:srgbClr val="000000"/>
                   </a:solidFill>
@@ -2361,7 +3043,7 @@
             </a:ln>
             <a:extLst>
               <a:ext uri="{91240B29-F687-4f45-9708-019B960494DF}">
-                <a14:hiddenLine xmlns:a14="http://schemas.microsoft.com/office/drawing/2010/main" xmlns="" w="9525">
+                <a14:hiddenLine xmlns="" xmlns:a14="http://schemas.microsoft.com/office/drawing/2010/main" w="9525">
                   <a:solidFill>
                     <a:srgbClr val="000000"/>
                   </a:solidFill>
@@ -2417,7 +3099,7 @@
             </a:ln>
             <a:extLst>
               <a:ext uri="{91240B29-F687-4f45-9708-019B960494DF}">
-                <a14:hiddenLine xmlns:a14="http://schemas.microsoft.com/office/drawing/2010/main" xmlns="" w="9525">
+                <a14:hiddenLine xmlns="" xmlns:a14="http://schemas.microsoft.com/office/drawing/2010/main" w="9525">
                   <a:solidFill>
                     <a:srgbClr val="000000"/>
                   </a:solidFill>
@@ -2507,7 +3189,7 @@
             </a:ln>
             <a:extLst>
               <a:ext uri="{91240B29-F687-4f45-9708-019B960494DF}">
-                <a14:hiddenLine xmlns:a14="http://schemas.microsoft.com/office/drawing/2010/main" xmlns="" w="9525">
+                <a14:hiddenLine xmlns="" xmlns:a14="http://schemas.microsoft.com/office/drawing/2010/main" w="9525">
                   <a:solidFill>
                     <a:srgbClr val="000000"/>
                   </a:solidFill>
@@ -2563,7 +3245,7 @@
             </a:ln>
             <a:extLst>
               <a:ext uri="{91240B29-F687-4f45-9708-019B960494DF}">
-                <a14:hiddenLine xmlns:a14="http://schemas.microsoft.com/office/drawing/2010/main" xmlns="" w="9525">
+                <a14:hiddenLine xmlns="" xmlns:a14="http://schemas.microsoft.com/office/drawing/2010/main" w="9525">
                   <a:solidFill>
                     <a:srgbClr val="000000"/>
                   </a:solidFill>
@@ -2653,7 +3335,7 @@
             </a:ln>
             <a:extLst>
               <a:ext uri="{91240B29-F687-4f45-9708-019B960494DF}">
-                <a14:hiddenLine xmlns:a14="http://schemas.microsoft.com/office/drawing/2010/main" xmlns="" w="9525">
+                <a14:hiddenLine xmlns="" xmlns:a14="http://schemas.microsoft.com/office/drawing/2010/main" w="9525">
                   <a:solidFill>
                     <a:srgbClr val="000000"/>
                   </a:solidFill>
@@ -2721,7 +3403,7 @@
             </a:ln>
             <a:extLst>
               <a:ext uri="{91240B29-F687-4f45-9708-019B960494DF}">
-                <a14:hiddenLine xmlns:a14="http://schemas.microsoft.com/office/drawing/2010/main" xmlns="" w="9525">
+                <a14:hiddenLine xmlns="" xmlns:a14="http://schemas.microsoft.com/office/drawing/2010/main" w="9525">
                   <a:solidFill>
                     <a:srgbClr val="000000"/>
                   </a:solidFill>
@@ -2811,7 +3493,7 @@
             </a:ln>
             <a:extLst>
               <a:ext uri="{91240B29-F687-4f45-9708-019B960494DF}">
-                <a14:hiddenLine xmlns:a14="http://schemas.microsoft.com/office/drawing/2010/main" xmlns="" w="9525">
+                <a14:hiddenLine xmlns="" xmlns:a14="http://schemas.microsoft.com/office/drawing/2010/main" w="9525">
                   <a:solidFill>
                     <a:srgbClr val="000000"/>
                   </a:solidFill>
@@ -2879,7 +3561,7 @@
             </a:ln>
             <a:extLst>
               <a:ext uri="{91240B29-F687-4f45-9708-019B960494DF}">
-                <a14:hiddenLine xmlns:a14="http://schemas.microsoft.com/office/drawing/2010/main" xmlns="" w="9525">
+                <a14:hiddenLine xmlns="" xmlns:a14="http://schemas.microsoft.com/office/drawing/2010/main" w="9525">
                   <a:solidFill>
                     <a:srgbClr val="000000"/>
                   </a:solidFill>
@@ -2969,7 +3651,7 @@
             </a:ln>
             <a:extLst>
               <a:ext uri="{91240B29-F687-4f45-9708-019B960494DF}">
-                <a14:hiddenLine xmlns:a14="http://schemas.microsoft.com/office/drawing/2010/main" xmlns="" w="9525">
+                <a14:hiddenLine xmlns="" xmlns:a14="http://schemas.microsoft.com/office/drawing/2010/main" w="9525">
                   <a:solidFill>
                     <a:srgbClr val="000000"/>
                   </a:solidFill>
@@ -3003,7 +3685,7 @@
             </a:ln>
             <a:extLst>
               <a:ext uri="{91240B29-F687-4f45-9708-019B960494DF}">
-                <a14:hiddenLine xmlns:a14="http://schemas.microsoft.com/office/drawing/2010/main" xmlns="" w="9525">
+                <a14:hiddenLine xmlns="" xmlns:a14="http://schemas.microsoft.com/office/drawing/2010/main" w="9525">
                   <a:solidFill>
                     <a:srgbClr val="000000"/>
                   </a:solidFill>
@@ -3093,7 +3775,7 @@
             </a:ln>
             <a:extLst>
               <a:ext uri="{91240B29-F687-4f45-9708-019B960494DF}">
-                <a14:hiddenLine xmlns:a14="http://schemas.microsoft.com/office/drawing/2010/main" xmlns="" w="9525">
+                <a14:hiddenLine xmlns="" xmlns:a14="http://schemas.microsoft.com/office/drawing/2010/main" w="9525">
                   <a:solidFill>
                     <a:srgbClr val="000000"/>
                   </a:solidFill>
@@ -3155,7 +3837,7 @@
             </a:ln>
             <a:extLst>
               <a:ext uri="{91240B29-F687-4f45-9708-019B960494DF}">
-                <a14:hiddenLine xmlns:a14="http://schemas.microsoft.com/office/drawing/2010/main" xmlns="" w="9525">
+                <a14:hiddenLine xmlns="" xmlns:a14="http://schemas.microsoft.com/office/drawing/2010/main" w="9525">
                   <a:solidFill>
                     <a:srgbClr val="000000"/>
                   </a:solidFill>
@@ -3217,7 +3899,7 @@
             </a:ln>
             <a:extLst>
               <a:ext uri="{91240B29-F687-4f45-9708-019B960494DF}">
-                <a14:hiddenLine xmlns:a14="http://schemas.microsoft.com/office/drawing/2010/main" xmlns="" w="9525">
+                <a14:hiddenLine xmlns="" xmlns:a14="http://schemas.microsoft.com/office/drawing/2010/main" w="9525">
                   <a:solidFill>
                     <a:srgbClr val="000000"/>
                   </a:solidFill>
@@ -3307,7 +3989,7 @@
             </a:ln>
             <a:extLst>
               <a:ext uri="{91240B29-F687-4f45-9708-019B960494DF}">
-                <a14:hiddenLine xmlns:a14="http://schemas.microsoft.com/office/drawing/2010/main" xmlns="" w="9525">
+                <a14:hiddenLine xmlns="" xmlns:a14="http://schemas.microsoft.com/office/drawing/2010/main" w="9525">
                   <a:solidFill>
                     <a:srgbClr val="000000"/>
                   </a:solidFill>
@@ -3375,7 +4057,7 @@
             </a:ln>
             <a:extLst>
               <a:ext uri="{91240B29-F687-4f45-9708-019B960494DF}">
-                <a14:hiddenLine xmlns:a14="http://schemas.microsoft.com/office/drawing/2010/main" xmlns="" w="9525">
+                <a14:hiddenLine xmlns="" xmlns:a14="http://schemas.microsoft.com/office/drawing/2010/main" w="9525">
                   <a:solidFill>
                     <a:srgbClr val="000000"/>
                   </a:solidFill>
@@ -3437,7 +4119,7 @@
             </a:ln>
             <a:extLst>
               <a:ext uri="{91240B29-F687-4f45-9708-019B960494DF}">
-                <a14:hiddenLine xmlns:a14="http://schemas.microsoft.com/office/drawing/2010/main" xmlns="" w="9525">
+                <a14:hiddenLine xmlns="" xmlns:a14="http://schemas.microsoft.com/office/drawing/2010/main" w="9525">
                   <a:solidFill>
                     <a:srgbClr val="000000"/>
                   </a:solidFill>
@@ -3527,7 +4209,7 @@
             </a:ln>
             <a:extLst>
               <a:ext uri="{91240B29-F687-4f45-9708-019B960494DF}">
-                <a14:hiddenLine xmlns:a14="http://schemas.microsoft.com/office/drawing/2010/main" xmlns="" w="9525">
+                <a14:hiddenLine xmlns="" xmlns:a14="http://schemas.microsoft.com/office/drawing/2010/main" w="9525">
                   <a:solidFill>
                     <a:srgbClr val="000000"/>
                   </a:solidFill>
@@ -3589,7 +4271,7 @@
             </a:ln>
             <a:extLst>
               <a:ext uri="{91240B29-F687-4f45-9708-019B960494DF}">
-                <a14:hiddenLine xmlns:a14="http://schemas.microsoft.com/office/drawing/2010/main" xmlns="" w="9525">
+                <a14:hiddenLine xmlns="" xmlns:a14="http://schemas.microsoft.com/office/drawing/2010/main" w="9525">
                   <a:solidFill>
                     <a:srgbClr val="000000"/>
                   </a:solidFill>
@@ -3679,7 +4361,7 @@
             </a:ln>
             <a:extLst>
               <a:ext uri="{91240B29-F687-4f45-9708-019B960494DF}">
-                <a14:hiddenLine xmlns:a14="http://schemas.microsoft.com/office/drawing/2010/main" xmlns="" w="9525">
+                <a14:hiddenLine xmlns="" xmlns:a14="http://schemas.microsoft.com/office/drawing/2010/main" w="9525">
                   <a:solidFill>
                     <a:srgbClr val="000000"/>
                   </a:solidFill>
@@ -3741,7 +4423,7 @@
             </a:ln>
             <a:extLst>
               <a:ext uri="{91240B29-F687-4f45-9708-019B960494DF}">
-                <a14:hiddenLine xmlns:a14="http://schemas.microsoft.com/office/drawing/2010/main" xmlns="" w="9525">
+                <a14:hiddenLine xmlns="" xmlns:a14="http://schemas.microsoft.com/office/drawing/2010/main" w="9525">
                   <a:solidFill>
                     <a:srgbClr val="000000"/>
                   </a:solidFill>
@@ -3831,7 +4513,7 @@
             </a:ln>
             <a:extLst>
               <a:ext uri="{91240B29-F687-4f45-9708-019B960494DF}">
-                <a14:hiddenLine xmlns:a14="http://schemas.microsoft.com/office/drawing/2010/main" xmlns="" w="9525">
+                <a14:hiddenLine xmlns="" xmlns:a14="http://schemas.microsoft.com/office/drawing/2010/main" w="9525">
                   <a:solidFill>
                     <a:srgbClr val="000000"/>
                   </a:solidFill>
@@ -3865,7 +4547,7 @@
             </a:ln>
             <a:extLst>
               <a:ext uri="{91240B29-F687-4f45-9708-019B960494DF}">
-                <a14:hiddenLine xmlns:a14="http://schemas.microsoft.com/office/drawing/2010/main" xmlns="" w="9525">
+                <a14:hiddenLine xmlns="" xmlns:a14="http://schemas.microsoft.com/office/drawing/2010/main" w="9525">
                   <a:solidFill>
                     <a:srgbClr val="000000"/>
                   </a:solidFill>
@@ -3930,7 +4612,7 @@
             </a:ln>
             <a:extLst>
               <a:ext uri="{91240B29-F687-4f45-9708-019B960494DF}">
-                <a14:hiddenLine xmlns:a14="http://schemas.microsoft.com/office/drawing/2010/main" xmlns="" w="9525">
+                <a14:hiddenLine xmlns="" xmlns:a14="http://schemas.microsoft.com/office/drawing/2010/main" w="9525">
                   <a:solidFill>
                     <a:srgbClr val="000000"/>
                   </a:solidFill>
@@ -4020,7 +4702,7 @@
             </a:ln>
             <a:extLst>
               <a:ext uri="{91240B29-F687-4f45-9708-019B960494DF}">
-                <a14:hiddenLine xmlns:a14="http://schemas.microsoft.com/office/drawing/2010/main" xmlns="" w="9525">
+                <a14:hiddenLine xmlns="" xmlns:a14="http://schemas.microsoft.com/office/drawing/2010/main" w="9525">
                   <a:solidFill>
                     <a:srgbClr val="000000"/>
                   </a:solidFill>
@@ -4082,7 +4764,7 @@
             </a:ln>
             <a:extLst>
               <a:ext uri="{91240B29-F687-4f45-9708-019B960494DF}">
-                <a14:hiddenLine xmlns:a14="http://schemas.microsoft.com/office/drawing/2010/main" xmlns="" w="9525">
+                <a14:hiddenLine xmlns="" xmlns:a14="http://schemas.microsoft.com/office/drawing/2010/main" w="9525">
                   <a:solidFill>
                     <a:srgbClr val="000000"/>
                   </a:solidFill>
@@ -4172,7 +4854,7 @@
             </a:ln>
             <a:extLst>
               <a:ext uri="{91240B29-F687-4f45-9708-019B960494DF}">
-                <a14:hiddenLine xmlns:a14="http://schemas.microsoft.com/office/drawing/2010/main" xmlns="" w="9525">
+                <a14:hiddenLine xmlns="" xmlns:a14="http://schemas.microsoft.com/office/drawing/2010/main" w="9525">
                   <a:solidFill>
                     <a:srgbClr val="000000"/>
                   </a:solidFill>
@@ -4262,7 +4944,7 @@
             </a:ln>
             <a:extLst>
               <a:ext uri="{91240B29-F687-4f45-9708-019B960494DF}">
-                <a14:hiddenLine xmlns:a14="http://schemas.microsoft.com/office/drawing/2010/main" xmlns="" w="9525">
+                <a14:hiddenLine xmlns="" xmlns:a14="http://schemas.microsoft.com/office/drawing/2010/main" w="9525">
                   <a:solidFill>
                     <a:srgbClr val="000000"/>
                   </a:solidFill>
@@ -4327,7 +5009,7 @@
             </a:ln>
             <a:extLst>
               <a:ext uri="{91240B29-F687-4f45-9708-019B960494DF}">
-                <a14:hiddenLine xmlns:a14="http://schemas.microsoft.com/office/drawing/2010/main" xmlns="" w="9525">
+                <a14:hiddenLine xmlns="" xmlns:a14="http://schemas.microsoft.com/office/drawing/2010/main" w="9525">
                   <a:solidFill>
                     <a:srgbClr val="000000"/>
                   </a:solidFill>
@@ -4389,7 +5071,7 @@
             </a:ln>
             <a:extLst>
               <a:ext uri="{91240B29-F687-4f45-9708-019B960494DF}">
-                <a14:hiddenLine xmlns:a14="http://schemas.microsoft.com/office/drawing/2010/main" xmlns="" w="9525">
+                <a14:hiddenLine xmlns="" xmlns:a14="http://schemas.microsoft.com/office/drawing/2010/main" w="9525">
                   <a:solidFill>
                     <a:srgbClr val="000000"/>
                   </a:solidFill>
@@ -4479,7 +5161,7 @@
             </a:ln>
             <a:extLst>
               <a:ext uri="{91240B29-F687-4f45-9708-019B960494DF}">
-                <a14:hiddenLine xmlns:a14="http://schemas.microsoft.com/office/drawing/2010/main" xmlns="" w="9525">
+                <a14:hiddenLine xmlns="" xmlns:a14="http://schemas.microsoft.com/office/drawing/2010/main" w="9525">
                   <a:solidFill>
                     <a:srgbClr val="000000"/>
                   </a:solidFill>
@@ -4569,7 +5251,7 @@
             </a:ln>
             <a:extLst>
               <a:ext uri="{91240B29-F687-4f45-9708-019B960494DF}">
-                <a14:hiddenLine xmlns:a14="http://schemas.microsoft.com/office/drawing/2010/main" xmlns="" w="9525">
+                <a14:hiddenLine xmlns="" xmlns:a14="http://schemas.microsoft.com/office/drawing/2010/main" w="9525">
                   <a:solidFill>
                     <a:srgbClr val="000000"/>
                   </a:solidFill>
@@ -4631,7 +5313,7 @@
             </a:ln>
             <a:extLst>
               <a:ext uri="{91240B29-F687-4f45-9708-019B960494DF}">
-                <a14:hiddenLine xmlns:a14="http://schemas.microsoft.com/office/drawing/2010/main" xmlns="" w="9525">
+                <a14:hiddenLine xmlns="" xmlns:a14="http://schemas.microsoft.com/office/drawing/2010/main" w="9525">
                   <a:solidFill>
                     <a:srgbClr val="000000"/>
                   </a:solidFill>
@@ -4751,7 +5433,7 @@
             </a:ln>
             <a:extLst>
               <a:ext uri="{91240B29-F687-4f45-9708-019B960494DF}">
-                <a14:hiddenLine xmlns:a14="http://schemas.microsoft.com/office/drawing/2010/main" xmlns="" w="9525">
+                <a14:hiddenLine xmlns="" xmlns:a14="http://schemas.microsoft.com/office/drawing/2010/main" w="9525">
                   <a:solidFill>
                     <a:srgbClr val="000000"/>
                   </a:solidFill>
@@ -4819,7 +5501,7 @@
             </a:ln>
             <a:extLst>
               <a:ext uri="{91240B29-F687-4f45-9708-019B960494DF}">
-                <a14:hiddenLine xmlns:a14="http://schemas.microsoft.com/office/drawing/2010/main" xmlns="" w="9525">
+                <a14:hiddenLine xmlns="" xmlns:a14="http://schemas.microsoft.com/office/drawing/2010/main" w="9525">
                   <a:solidFill>
                     <a:srgbClr val="000000"/>
                   </a:solidFill>
@@ -4909,7 +5591,7 @@
             </a:ln>
             <a:extLst>
               <a:ext uri="{91240B29-F687-4f45-9708-019B960494DF}">
-                <a14:hiddenLine xmlns:a14="http://schemas.microsoft.com/office/drawing/2010/main" xmlns="" w="9525">
+                <a14:hiddenLine xmlns="" xmlns:a14="http://schemas.microsoft.com/office/drawing/2010/main" w="9525">
                   <a:solidFill>
                     <a:srgbClr val="000000"/>
                   </a:solidFill>
@@ -5049,7 +5731,7 @@
           <a:p>
             <a:fld id="{48A87A34-81AB-432B-8DAE-1953F412C126}" type="datetimeFigureOut">
               <a:rPr lang="en-US" dirty="0"/>
-              <a:t>2/15/2023</a:t>
+              <a:t>2/21/2023</a:t>
             </a:fld>
             <a:endParaRPr lang="en-US" dirty="0"/>
           </a:p>
@@ -5311,7 +5993,7 @@
           <a:p>
             <a:fld id="{48A87A34-81AB-432B-8DAE-1953F412C126}" type="datetimeFigureOut">
               <a:rPr lang="en-US" dirty="0"/>
-              <a:t>2/15/2023</a:t>
+              <a:t>2/21/2023</a:t>
             </a:fld>
             <a:endParaRPr lang="en-US" dirty="0"/>
           </a:p>
@@ -5502,7 +6184,7 @@
           <a:p>
             <a:fld id="{48A87A34-81AB-432B-8DAE-1953F412C126}" type="datetimeFigureOut">
               <a:rPr lang="en-US" dirty="0"/>
-              <a:t>2/15/2023</a:t>
+              <a:t>2/21/2023</a:t>
             </a:fld>
             <a:endParaRPr lang="en-US" dirty="0"/>
           </a:p>
@@ -5760,7 +6442,7 @@
           <a:p>
             <a:fld id="{48A87A34-81AB-432B-8DAE-1953F412C126}" type="datetimeFigureOut">
               <a:rPr lang="en-US" dirty="0"/>
-              <a:t>2/15/2023</a:t>
+              <a:t>2/21/2023</a:t>
             </a:fld>
             <a:endParaRPr lang="en-US" dirty="0"/>
           </a:p>
@@ -6189,7 +6871,7 @@
           <a:p>
             <a:fld id="{48A87A34-81AB-432B-8DAE-1953F412C126}" type="datetimeFigureOut">
               <a:rPr lang="en-US" dirty="0"/>
-              <a:t>2/15/2023</a:t>
+              <a:t>2/21/2023</a:t>
             </a:fld>
             <a:endParaRPr lang="en-US" dirty="0"/>
           </a:p>
@@ -6730,7 +7412,7 @@
           <a:p>
             <a:fld id="{48A87A34-81AB-432B-8DAE-1953F412C126}" type="datetimeFigureOut">
               <a:rPr lang="en-US" dirty="0"/>
-              <a:t>2/15/2023</a:t>
+              <a:t>2/21/2023</a:t>
             </a:fld>
             <a:endParaRPr lang="en-US" dirty="0"/>
           </a:p>
@@ -7445,7 +8127,7 @@
           <a:p>
             <a:fld id="{48A87A34-81AB-432B-8DAE-1953F412C126}" type="datetimeFigureOut">
               <a:rPr lang="en-US" dirty="0"/>
-              <a:t>2/15/2023</a:t>
+              <a:t>2/21/2023</a:t>
             </a:fld>
             <a:endParaRPr lang="en-US" dirty="0"/>
           </a:p>
@@ -7610,7 +8292,7 @@
           <a:p>
             <a:fld id="{48A87A34-81AB-432B-8DAE-1953F412C126}" type="datetimeFigureOut">
               <a:rPr lang="en-US" dirty="0"/>
-              <a:t>2/15/2023</a:t>
+              <a:t>2/21/2023</a:t>
             </a:fld>
             <a:endParaRPr lang="en-US" dirty="0"/>
           </a:p>
@@ -7785,7 +8467,7 @@
           <a:p>
             <a:fld id="{48A87A34-81AB-432B-8DAE-1953F412C126}" type="datetimeFigureOut">
               <a:rPr lang="en-US" dirty="0"/>
-              <a:t>2/15/2023</a:t>
+              <a:t>2/21/2023</a:t>
             </a:fld>
             <a:endParaRPr lang="en-US" dirty="0"/>
           </a:p>
@@ -7950,7 +8632,7 @@
           <a:p>
             <a:fld id="{48A87A34-81AB-432B-8DAE-1953F412C126}" type="datetimeFigureOut">
               <a:rPr lang="en-US" dirty="0"/>
-              <a:t>2/15/2023</a:t>
+              <a:t>2/21/2023</a:t>
             </a:fld>
             <a:endParaRPr lang="en-US" dirty="0"/>
           </a:p>
@@ -8195,7 +8877,7 @@
           <a:p>
             <a:fld id="{48A87A34-81AB-432B-8DAE-1953F412C126}" type="datetimeFigureOut">
               <a:rPr lang="en-US" dirty="0"/>
-              <a:t>2/15/2023</a:t>
+              <a:t>2/21/2023</a:t>
             </a:fld>
             <a:endParaRPr lang="en-US" dirty="0"/>
           </a:p>
@@ -8422,7 +9104,7 @@
           <a:p>
             <a:fld id="{48A87A34-81AB-432B-8DAE-1953F412C126}" type="datetimeFigureOut">
               <a:rPr lang="en-US" dirty="0"/>
-              <a:t>2/15/2023</a:t>
+              <a:t>2/21/2023</a:t>
             </a:fld>
             <a:endParaRPr lang="en-US" dirty="0"/>
           </a:p>
@@ -8798,7 +9480,7 @@
           <a:p>
             <a:fld id="{48A87A34-81AB-432B-8DAE-1953F412C126}" type="datetimeFigureOut">
               <a:rPr lang="en-US" dirty="0"/>
-              <a:t>2/15/2023</a:t>
+              <a:t>2/21/2023</a:t>
             </a:fld>
             <a:endParaRPr lang="en-US" dirty="0"/>
           </a:p>
@@ -8911,7 +9593,7 @@
           <a:p>
             <a:fld id="{48A87A34-81AB-432B-8DAE-1953F412C126}" type="datetimeFigureOut">
               <a:rPr lang="en-US" dirty="0"/>
-              <a:t>2/15/2023</a:t>
+              <a:t>2/21/2023</a:t>
             </a:fld>
             <a:endParaRPr lang="en-US" dirty="0"/>
           </a:p>
@@ -9001,7 +9683,7 @@
           <a:p>
             <a:fld id="{48A87A34-81AB-432B-8DAE-1953F412C126}" type="datetimeFigureOut">
               <a:rPr lang="en-US" dirty="0"/>
-              <a:t>2/15/2023</a:t>
+              <a:t>2/21/2023</a:t>
             </a:fld>
             <a:endParaRPr lang="en-US" dirty="0"/>
           </a:p>
@@ -9245,7 +9927,7 @@
           <a:p>
             <a:fld id="{48A87A34-81AB-432B-8DAE-1953F412C126}" type="datetimeFigureOut">
               <a:rPr lang="en-US" dirty="0"/>
-              <a:t>2/15/2023</a:t>
+              <a:t>2/21/2023</a:t>
             </a:fld>
             <a:endParaRPr lang="en-US" dirty="0"/>
           </a:p>
@@ -9520,7 +10202,7 @@
           <a:p>
             <a:fld id="{48A87A34-81AB-432B-8DAE-1953F412C126}" type="datetimeFigureOut">
               <a:rPr lang="en-US" dirty="0"/>
-              <a:t>2/15/2023</a:t>
+              <a:t>2/21/2023</a:t>
             </a:fld>
             <a:endParaRPr lang="en-US" dirty="0"/>
           </a:p>
@@ -9631,7 +10313,7 @@
           <a:noFill/>
           <a:extLst>
             <a:ext uri="{909E8E84-426E-40dd-AFC4-6F175D3DCCD1}">
-              <a14:hiddenFill xmlns:a14="http://schemas.microsoft.com/office/drawing/2010/main" xmlns="">
+              <a14:hiddenFill xmlns="" xmlns:a14="http://schemas.microsoft.com/office/drawing/2010/main">
                 <a:solidFill>
                   <a:srgbClr val="FFFFFF"/>
                 </a:solidFill>
@@ -9705,7 +10387,7 @@
               </a:ln>
               <a:extLst>
                 <a:ext uri="{91240B29-F687-4f45-9708-019B960494DF}">
-                  <a14:hiddenLine xmlns:a14="http://schemas.microsoft.com/office/drawing/2010/main" xmlns="" w="9525">
+                  <a14:hiddenLine xmlns="" xmlns:a14="http://schemas.microsoft.com/office/drawing/2010/main" w="9525">
                     <a:solidFill>
                       <a:srgbClr val="000000"/>
                     </a:solidFill>
@@ -9795,7 +10477,7 @@
               </a:ln>
               <a:extLst>
                 <a:ext uri="{91240B29-F687-4f45-9708-019B960494DF}">
-                  <a14:hiddenLine xmlns:a14="http://schemas.microsoft.com/office/drawing/2010/main" xmlns="" w="9525">
+                  <a14:hiddenLine xmlns="" xmlns:a14="http://schemas.microsoft.com/office/drawing/2010/main" w="9525">
                     <a:solidFill>
                       <a:srgbClr val="000000"/>
                     </a:solidFill>
@@ -9885,7 +10567,7 @@
               </a:ln>
               <a:extLst>
                 <a:ext uri="{91240B29-F687-4f45-9708-019B960494DF}">
-                  <a14:hiddenLine xmlns:a14="http://schemas.microsoft.com/office/drawing/2010/main" xmlns="" w="9525">
+                  <a14:hiddenLine xmlns="" xmlns:a14="http://schemas.microsoft.com/office/drawing/2010/main" w="9525">
                     <a:solidFill>
                       <a:srgbClr val="000000"/>
                     </a:solidFill>
@@ -9947,7 +10629,7 @@
               </a:ln>
               <a:extLst>
                 <a:ext uri="{91240B29-F687-4f45-9708-019B960494DF}">
-                  <a14:hiddenLine xmlns:a14="http://schemas.microsoft.com/office/drawing/2010/main" xmlns="" w="9525">
+                  <a14:hiddenLine xmlns="" xmlns:a14="http://schemas.microsoft.com/office/drawing/2010/main" w="9525">
                     <a:solidFill>
                       <a:srgbClr val="000000"/>
                     </a:solidFill>
@@ -10037,7 +10719,7 @@
               </a:ln>
               <a:extLst>
                 <a:ext uri="{91240B29-F687-4f45-9708-019B960494DF}">
-                  <a14:hiddenLine xmlns:a14="http://schemas.microsoft.com/office/drawing/2010/main" xmlns="" w="9525">
+                  <a14:hiddenLine xmlns="" xmlns:a14="http://schemas.microsoft.com/office/drawing/2010/main" w="9525">
                     <a:solidFill>
                       <a:srgbClr val="000000"/>
                     </a:solidFill>
@@ -10099,7 +10781,7 @@
               </a:ln>
               <a:extLst>
                 <a:ext uri="{91240B29-F687-4f45-9708-019B960494DF}">
-                  <a14:hiddenLine xmlns:a14="http://schemas.microsoft.com/office/drawing/2010/main" xmlns="" w="9525">
+                  <a14:hiddenLine xmlns="" xmlns:a14="http://schemas.microsoft.com/office/drawing/2010/main" w="9525">
                     <a:solidFill>
                       <a:srgbClr val="000000"/>
                     </a:solidFill>
@@ -10161,7 +10843,7 @@
               </a:ln>
               <a:extLst>
                 <a:ext uri="{91240B29-F687-4f45-9708-019B960494DF}">
-                  <a14:hiddenLine xmlns:a14="http://schemas.microsoft.com/office/drawing/2010/main" xmlns="" w="9525">
+                  <a14:hiddenLine xmlns="" xmlns:a14="http://schemas.microsoft.com/office/drawing/2010/main" w="9525">
                     <a:solidFill>
                       <a:srgbClr val="000000"/>
                     </a:solidFill>
@@ -10251,7 +10933,7 @@
               </a:ln>
               <a:extLst>
                 <a:ext uri="{91240B29-F687-4f45-9708-019B960494DF}">
-                  <a14:hiddenLine xmlns:a14="http://schemas.microsoft.com/office/drawing/2010/main" xmlns="" w="9525">
+                  <a14:hiddenLine xmlns="" xmlns:a14="http://schemas.microsoft.com/office/drawing/2010/main" w="9525">
                     <a:solidFill>
                       <a:srgbClr val="000000"/>
                     </a:solidFill>
@@ -10341,7 +11023,7 @@
               </a:ln>
               <a:extLst>
                 <a:ext uri="{91240B29-F687-4f45-9708-019B960494DF}">
-                  <a14:hiddenLine xmlns:a14="http://schemas.microsoft.com/office/drawing/2010/main" xmlns="" w="9525">
+                  <a14:hiddenLine xmlns="" xmlns:a14="http://schemas.microsoft.com/office/drawing/2010/main" w="9525">
                     <a:solidFill>
                       <a:srgbClr val="000000"/>
                     </a:solidFill>
@@ -10403,7 +11085,7 @@
               </a:ln>
               <a:extLst>
                 <a:ext uri="{91240B29-F687-4f45-9708-019B960494DF}">
-                  <a14:hiddenLine xmlns:a14="http://schemas.microsoft.com/office/drawing/2010/main" xmlns="" w="9525">
+                  <a14:hiddenLine xmlns="" xmlns:a14="http://schemas.microsoft.com/office/drawing/2010/main" w="9525">
                     <a:solidFill>
                       <a:srgbClr val="000000"/>
                     </a:solidFill>
@@ -10513,7 +11195,7 @@
               </a:ln>
               <a:extLst>
                 <a:ext uri="{91240B29-F687-4f45-9708-019B960494DF}">
-                  <a14:hiddenLine xmlns:a14="http://schemas.microsoft.com/office/drawing/2010/main" xmlns="" w="9525">
+                  <a14:hiddenLine xmlns="" xmlns:a14="http://schemas.microsoft.com/office/drawing/2010/main" w="9525">
                     <a:solidFill>
                       <a:srgbClr val="000000"/>
                     </a:solidFill>
@@ -10597,7 +11279,7 @@
               </a:ln>
               <a:extLst>
                 <a:ext uri="{91240B29-F687-4f45-9708-019B960494DF}">
-                  <a14:hiddenLine xmlns:a14="http://schemas.microsoft.com/office/drawing/2010/main" xmlns="" w="9525">
+                  <a14:hiddenLine xmlns="" xmlns:a14="http://schemas.microsoft.com/office/drawing/2010/main" w="9525">
                     <a:solidFill>
                       <a:srgbClr val="000000"/>
                     </a:solidFill>
@@ -10659,7 +11341,7 @@
               </a:ln>
               <a:extLst>
                 <a:ext uri="{91240B29-F687-4f45-9708-019B960494DF}">
-                  <a14:hiddenLine xmlns:a14="http://schemas.microsoft.com/office/drawing/2010/main" xmlns="" w="9525">
+                  <a14:hiddenLine xmlns="" xmlns:a14="http://schemas.microsoft.com/office/drawing/2010/main" w="9525">
                     <a:solidFill>
                       <a:srgbClr val="000000"/>
                     </a:solidFill>
@@ -10721,7 +11403,7 @@
               </a:ln>
               <a:extLst>
                 <a:ext uri="{91240B29-F687-4f45-9708-019B960494DF}">
-                  <a14:hiddenLine xmlns:a14="http://schemas.microsoft.com/office/drawing/2010/main" xmlns="" w="9525">
+                  <a14:hiddenLine xmlns="" xmlns:a14="http://schemas.microsoft.com/office/drawing/2010/main" w="9525">
                     <a:solidFill>
                       <a:srgbClr val="000000"/>
                     </a:solidFill>
@@ -10811,7 +11493,7 @@
               </a:ln>
               <a:extLst>
                 <a:ext uri="{91240B29-F687-4f45-9708-019B960494DF}">
-                  <a14:hiddenLine xmlns:a14="http://schemas.microsoft.com/office/drawing/2010/main" xmlns="" w="9525">
+                  <a14:hiddenLine xmlns="" xmlns:a14="http://schemas.microsoft.com/office/drawing/2010/main" w="9525">
                     <a:solidFill>
                       <a:srgbClr val="000000"/>
                     </a:solidFill>
@@ -10845,7 +11527,7 @@
               </a:ln>
               <a:extLst>
                 <a:ext uri="{91240B29-F687-4f45-9708-019B960494DF}">
-                  <a14:hiddenLine xmlns:a14="http://schemas.microsoft.com/office/drawing/2010/main" xmlns="" w="9525">
+                  <a14:hiddenLine xmlns="" xmlns:a14="http://schemas.microsoft.com/office/drawing/2010/main" w="9525">
                     <a:solidFill>
                       <a:srgbClr val="000000"/>
                     </a:solidFill>
@@ -10910,7 +11592,7 @@
               </a:ln>
               <a:extLst>
                 <a:ext uri="{91240B29-F687-4f45-9708-019B960494DF}">
-                  <a14:hiddenLine xmlns:a14="http://schemas.microsoft.com/office/drawing/2010/main" xmlns="" w="9525">
+                  <a14:hiddenLine xmlns="" xmlns:a14="http://schemas.microsoft.com/office/drawing/2010/main" w="9525">
                     <a:solidFill>
                       <a:srgbClr val="000000"/>
                     </a:solidFill>
@@ -11000,7 +11682,7 @@
               </a:ln>
               <a:extLst>
                 <a:ext uri="{91240B29-F687-4f45-9708-019B960494DF}">
-                  <a14:hiddenLine xmlns:a14="http://schemas.microsoft.com/office/drawing/2010/main" xmlns="" w="9525">
+                  <a14:hiddenLine xmlns="" xmlns:a14="http://schemas.microsoft.com/office/drawing/2010/main" w="9525">
                     <a:solidFill>
                       <a:srgbClr val="000000"/>
                     </a:solidFill>
@@ -11062,7 +11744,7 @@
               </a:ln>
               <a:extLst>
                 <a:ext uri="{91240B29-F687-4f45-9708-019B960494DF}">
-                  <a14:hiddenLine xmlns:a14="http://schemas.microsoft.com/office/drawing/2010/main" xmlns="" w="9525">
+                  <a14:hiddenLine xmlns="" xmlns:a14="http://schemas.microsoft.com/office/drawing/2010/main" w="9525">
                     <a:solidFill>
                       <a:srgbClr val="000000"/>
                     </a:solidFill>
@@ -11152,7 +11834,7 @@
               </a:ln>
               <a:extLst>
                 <a:ext uri="{91240B29-F687-4f45-9708-019B960494DF}">
-                  <a14:hiddenLine xmlns:a14="http://schemas.microsoft.com/office/drawing/2010/main" xmlns="" w="9525">
+                  <a14:hiddenLine xmlns="" xmlns:a14="http://schemas.microsoft.com/office/drawing/2010/main" w="9525">
                     <a:solidFill>
                       <a:srgbClr val="000000"/>
                     </a:solidFill>
@@ -11217,7 +11899,7 @@
               </a:ln>
               <a:extLst>
                 <a:ext uri="{91240B29-F687-4f45-9708-019B960494DF}">
-                  <a14:hiddenLine xmlns:a14="http://schemas.microsoft.com/office/drawing/2010/main" xmlns="" w="9525">
+                  <a14:hiddenLine xmlns="" xmlns:a14="http://schemas.microsoft.com/office/drawing/2010/main" w="9525">
                     <a:solidFill>
                       <a:srgbClr val="000000"/>
                     </a:solidFill>
@@ -11279,7 +11961,7 @@
               </a:ln>
               <a:extLst>
                 <a:ext uri="{91240B29-F687-4f45-9708-019B960494DF}">
-                  <a14:hiddenLine xmlns:a14="http://schemas.microsoft.com/office/drawing/2010/main" xmlns="" w="9525">
+                  <a14:hiddenLine xmlns="" xmlns:a14="http://schemas.microsoft.com/office/drawing/2010/main" w="9525">
                     <a:solidFill>
                       <a:srgbClr val="000000"/>
                     </a:solidFill>
@@ -11369,7 +12051,7 @@
               </a:ln>
               <a:extLst>
                 <a:ext uri="{91240B29-F687-4f45-9708-019B960494DF}">
-                  <a14:hiddenLine xmlns:a14="http://schemas.microsoft.com/office/drawing/2010/main" xmlns="" w="9525">
+                  <a14:hiddenLine xmlns="" xmlns:a14="http://schemas.microsoft.com/office/drawing/2010/main" w="9525">
                     <a:solidFill>
                       <a:srgbClr val="000000"/>
                     </a:solidFill>
@@ -11459,7 +12141,7 @@
               </a:ln>
               <a:extLst>
                 <a:ext uri="{91240B29-F687-4f45-9708-019B960494DF}">
-                  <a14:hiddenLine xmlns:a14="http://schemas.microsoft.com/office/drawing/2010/main" xmlns="" w="9525">
+                  <a14:hiddenLine xmlns="" xmlns:a14="http://schemas.microsoft.com/office/drawing/2010/main" w="9525">
                     <a:solidFill>
                       <a:srgbClr val="000000"/>
                     </a:solidFill>
@@ -11524,7 +12206,7 @@
               </a:ln>
               <a:extLst>
                 <a:ext uri="{91240B29-F687-4f45-9708-019B960494DF}">
-                  <a14:hiddenLine xmlns:a14="http://schemas.microsoft.com/office/drawing/2010/main" xmlns="" w="9525">
+                  <a14:hiddenLine xmlns="" xmlns:a14="http://schemas.microsoft.com/office/drawing/2010/main" w="9525">
                     <a:solidFill>
                       <a:srgbClr val="000000"/>
                     </a:solidFill>
@@ -11644,7 +12326,7 @@
               </a:ln>
               <a:extLst>
                 <a:ext uri="{91240B29-F687-4f45-9708-019B960494DF}">
-                  <a14:hiddenLine xmlns:a14="http://schemas.microsoft.com/office/drawing/2010/main" xmlns="" w="9525">
+                  <a14:hiddenLine xmlns="" xmlns:a14="http://schemas.microsoft.com/office/drawing/2010/main" w="9525">
                     <a:solidFill>
                       <a:srgbClr val="000000"/>
                     </a:solidFill>
@@ -11742,7 +12424,7 @@
               </a:ln>
               <a:extLst>
                 <a:ext uri="{91240B29-F687-4f45-9708-019B960494DF}">
-                  <a14:hiddenLine xmlns:a14="http://schemas.microsoft.com/office/drawing/2010/main" xmlns="" w="9525">
+                  <a14:hiddenLine xmlns="" xmlns:a14="http://schemas.microsoft.com/office/drawing/2010/main" w="9525">
                     <a:solidFill>
                       <a:srgbClr val="000000"/>
                     </a:solidFill>
@@ -11857,7 +12539,7 @@
               </a:ln>
               <a:extLst>
                 <a:ext uri="{91240B29-F687-4f45-9708-019B960494DF}">
-                  <a14:hiddenLine xmlns:a14="http://schemas.microsoft.com/office/drawing/2010/main" xmlns="" w="9525">
+                  <a14:hiddenLine xmlns="" xmlns:a14="http://schemas.microsoft.com/office/drawing/2010/main" w="9525">
                     <a:solidFill>
                       <a:srgbClr val="000000"/>
                     </a:solidFill>
@@ -11947,7 +12629,7 @@
               </a:ln>
               <a:extLst>
                 <a:ext uri="{91240B29-F687-4f45-9708-019B960494DF}">
-                  <a14:hiddenLine xmlns:a14="http://schemas.microsoft.com/office/drawing/2010/main" xmlns="" w="9525">
+                  <a14:hiddenLine xmlns="" xmlns:a14="http://schemas.microsoft.com/office/drawing/2010/main" w="9525">
                     <a:solidFill>
                       <a:srgbClr val="000000"/>
                     </a:solidFill>
@@ -12012,7 +12694,7 @@
               </a:ln>
               <a:extLst>
                 <a:ext uri="{91240B29-F687-4f45-9708-019B960494DF}">
-                  <a14:hiddenLine xmlns:a14="http://schemas.microsoft.com/office/drawing/2010/main" xmlns="" w="9525">
+                  <a14:hiddenLine xmlns="" xmlns:a14="http://schemas.microsoft.com/office/drawing/2010/main" w="9525">
                     <a:solidFill>
                       <a:srgbClr val="000000"/>
                     </a:solidFill>
@@ -12102,7 +12784,7 @@
               </a:ln>
               <a:extLst>
                 <a:ext uri="{91240B29-F687-4f45-9708-019B960494DF}">
-                  <a14:hiddenLine xmlns:a14="http://schemas.microsoft.com/office/drawing/2010/main" xmlns="" w="9525">
+                  <a14:hiddenLine xmlns="" xmlns:a14="http://schemas.microsoft.com/office/drawing/2010/main" w="9525">
                     <a:solidFill>
                       <a:srgbClr val="000000"/>
                     </a:solidFill>
@@ -12170,7 +12852,7 @@
               </a:ln>
               <a:extLst>
                 <a:ext uri="{91240B29-F687-4f45-9708-019B960494DF}">
-                  <a14:hiddenLine xmlns:a14="http://schemas.microsoft.com/office/drawing/2010/main" xmlns="" w="9525">
+                  <a14:hiddenLine xmlns="" xmlns:a14="http://schemas.microsoft.com/office/drawing/2010/main" w="9525">
                     <a:solidFill>
                       <a:srgbClr val="000000"/>
                     </a:solidFill>
@@ -12260,7 +12942,7 @@
               </a:ln>
               <a:extLst>
                 <a:ext uri="{91240B29-F687-4f45-9708-019B960494DF}">
-                  <a14:hiddenLine xmlns:a14="http://schemas.microsoft.com/office/drawing/2010/main" xmlns="" w="9525">
+                  <a14:hiddenLine xmlns="" xmlns:a14="http://schemas.microsoft.com/office/drawing/2010/main" w="9525">
                     <a:solidFill>
                       <a:srgbClr val="000000"/>
                     </a:solidFill>
@@ -12328,7 +13010,7 @@
               </a:ln>
               <a:extLst>
                 <a:ext uri="{91240B29-F687-4f45-9708-019B960494DF}">
-                  <a14:hiddenLine xmlns:a14="http://schemas.microsoft.com/office/drawing/2010/main" xmlns="" w="9525">
+                  <a14:hiddenLine xmlns="" xmlns:a14="http://schemas.microsoft.com/office/drawing/2010/main" w="9525">
                     <a:solidFill>
                       <a:srgbClr val="000000"/>
                     </a:solidFill>
@@ -12418,7 +13100,7 @@
               </a:ln>
               <a:extLst>
                 <a:ext uri="{91240B29-F687-4f45-9708-019B960494DF}">
-                  <a14:hiddenLine xmlns:a14="http://schemas.microsoft.com/office/drawing/2010/main" xmlns="" w="9525">
+                  <a14:hiddenLine xmlns="" xmlns:a14="http://schemas.microsoft.com/office/drawing/2010/main" w="9525">
                     <a:solidFill>
                       <a:srgbClr val="000000"/>
                     </a:solidFill>
@@ -12452,7 +13134,7 @@
               </a:ln>
               <a:extLst>
                 <a:ext uri="{91240B29-F687-4f45-9708-019B960494DF}">
-                  <a14:hiddenLine xmlns:a14="http://schemas.microsoft.com/office/drawing/2010/main" xmlns="" w="9525">
+                  <a14:hiddenLine xmlns="" xmlns:a14="http://schemas.microsoft.com/office/drawing/2010/main" w="9525">
                     <a:solidFill>
                       <a:srgbClr val="000000"/>
                     </a:solidFill>
@@ -12593,7 +13275,7 @@
             <a:fld id="{48A87A34-81AB-432B-8DAE-1953F412C126}" type="datetimeFigureOut">
               <a:rPr lang="en-US" dirty="0"/>
               <a:pPr/>
-              <a:t>2/15/2023</a:t>
+              <a:t>2/21/2023</a:t>
             </a:fld>
             <a:endParaRPr lang="en-US" dirty="0"/>
           </a:p>
@@ -13119,7 +13801,7 @@
           <p:nvPr/>
         </p:nvPicPr>
         <p:blipFill>
-          <a:blip r:embed="rId2">
+          <a:blip r:embed="rId3">
             <a:extLst>
               <a:ext uri="{28A0092B-C50C-407E-A947-70E740481C1C}">
                 <a14:useLocalDpi xmlns:a14="http://schemas.microsoft.com/office/drawing/2010/main" val="0"/>
@@ -13369,13 +14051,13 @@
   <p:clrMapOvr>
     <a:masterClrMapping/>
   </p:clrMapOvr>
-  <mc:AlternateContent xmlns:mc="http://schemas.openxmlformats.org/markup-compatibility/2006">
-    <mc:Choice xmlns:p15="http://schemas.microsoft.com/office/powerpoint/2012/main" Requires="p15">
+  <mc:AlternateContent xmlns:mc="http://schemas.openxmlformats.org/markup-compatibility/2006" xmlns:p15="http://schemas.microsoft.com/office/powerpoint/2012/main">
+    <mc:Choice Requires="p15">
       <p:transition xmlns:p14="http://schemas.microsoft.com/office/powerpoint/2010/main" spd="slow" p14:dur="3250">
         <p15:prstTrans prst="origami"/>
       </p:transition>
     </mc:Choice>
-    <mc:Fallback>
+    <mc:Fallback xmlns="">
       <p:transition spd="slow">
         <p:fade/>
       </p:transition>
@@ -14121,13 +14803,13 @@
   <p:clrMapOvr>
     <a:masterClrMapping/>
   </p:clrMapOvr>
-  <mc:AlternateContent xmlns:mc="http://schemas.openxmlformats.org/markup-compatibility/2006">
-    <mc:Choice xmlns:p15="http://schemas.microsoft.com/office/powerpoint/2012/main" Requires="p15">
+  <mc:AlternateContent xmlns:mc="http://schemas.openxmlformats.org/markup-compatibility/2006" xmlns:p15="http://schemas.microsoft.com/office/powerpoint/2012/main">
+    <mc:Choice Requires="p15">
       <p:transition xmlns:p14="http://schemas.microsoft.com/office/powerpoint/2010/main" spd="slow" p14:dur="3250">
         <p15:prstTrans prst="origami"/>
       </p:transition>
     </mc:Choice>
-    <mc:Fallback>
+    <mc:Fallback xmlns="">
       <p:transition spd="slow">
         <p:fade/>
       </p:transition>
@@ -14745,6 +15427,235 @@
           <a:lstStyle/>
           <a:p>
             <a:r>
+              <a:rPr lang="hu-HU" dirty="0" smtClean="0"/>
+              <a:t>adatbázis</a:t>
+            </a:r>
+            <a:endParaRPr lang="hu-HU" dirty="0"/>
+          </a:p>
+        </p:txBody>
+      </p:sp>
+      <p:pic>
+        <p:nvPicPr>
+          <p:cNvPr id="1026" name="Picture 2" descr="https://lh5.googleusercontent.com/FB_7McrXDMdv5ASqZLiSnogvc00p-UFDwEHb-bkVlHhX9KPD5nzrojVwBHwEAZzqcx-0hKRqxVovXQgPmkHiZg6GE2D37zrl2Y-7yZ0yISW0DdPei-47ZiU3646Vj-DoyxZyNersAinBvL4BzmIsfw=s2048"/>
+          <p:cNvPicPr>
+            <a:picLocks noChangeAspect="1" noChangeArrowheads="1"/>
+          </p:cNvPicPr>
+          <p:nvPr/>
+        </p:nvPicPr>
+        <p:blipFill>
+          <a:blip r:embed="rId3">
+            <a:extLst>
+              <a:ext uri="{28A0092B-C50C-407E-A947-70E740481C1C}">
+                <a14:useLocalDpi xmlns:a14="http://schemas.microsoft.com/office/drawing/2010/main" val="0"/>
+              </a:ext>
+            </a:extLst>
+          </a:blip>
+          <a:srcRect/>
+          <a:stretch>
+            <a:fillRect/>
+          </a:stretch>
+        </p:blipFill>
+        <p:spPr bwMode="auto">
+          <a:xfrm>
+            <a:off x="2617727" y="2097088"/>
+            <a:ext cx="6953370" cy="4389120"/>
+          </a:xfrm>
+          <a:prstGeom prst="rect">
+            <a:avLst/>
+          </a:prstGeom>
+          <a:noFill/>
+          <a:extLst>
+            <a:ext uri="{909E8E84-426E-40DD-AFC4-6F175D3DCCD1}">
+              <a14:hiddenFill xmlns:a14="http://schemas.microsoft.com/office/drawing/2010/main">
+                <a:solidFill>
+                  <a:srgbClr val="FFFFFF"/>
+                </a:solidFill>
+              </a14:hiddenFill>
+            </a:ext>
+          </a:extLst>
+        </p:spPr>
+      </p:pic>
+    </p:spTree>
+    <p:extLst>
+      <p:ext uri="{BB962C8B-B14F-4D97-AF65-F5344CB8AC3E}">
+        <p14:creationId xmlns:p14="http://schemas.microsoft.com/office/powerpoint/2010/main" val="1666520804"/>
+      </p:ext>
+    </p:extLst>
+  </p:cSld>
+  <p:clrMapOvr>
+    <a:masterClrMapping/>
+  </p:clrMapOvr>
+</p:sld>
+</file>
+
+<file path=ppt/slides/slide5.xml><?xml version="1.0" encoding="utf-8"?>
+<p:sld xmlns:a="http://schemas.openxmlformats.org/drawingml/2006/main" xmlns:r="http://schemas.openxmlformats.org/officeDocument/2006/relationships" xmlns:p="http://schemas.openxmlformats.org/presentationml/2006/main">
+  <p:cSld>
+    <p:spTree>
+      <p:nvGrpSpPr>
+        <p:cNvPr id="1" name=""/>
+        <p:cNvGrpSpPr/>
+        <p:nvPr/>
+      </p:nvGrpSpPr>
+      <p:grpSpPr>
+        <a:xfrm>
+          <a:off x="0" y="0"/>
+          <a:ext cx="0" cy="0"/>
+          <a:chOff x="0" y="0"/>
+          <a:chExt cx="0" cy="0"/>
+        </a:xfrm>
+      </p:grpSpPr>
+      <p:sp>
+        <p:nvSpPr>
+          <p:cNvPr id="2" name="Cím 1"/>
+          <p:cNvSpPr>
+            <a:spLocks noGrp="1"/>
+          </p:cNvSpPr>
+          <p:nvPr>
+            <p:ph type="title"/>
+          </p:nvPr>
+        </p:nvSpPr>
+        <p:spPr/>
+        <p:txBody>
+          <a:bodyPr/>
+          <a:lstStyle/>
+          <a:p>
+            <a:r>
+              <a:rPr lang="hu-HU" dirty="0" smtClean="0"/>
+              <a:t>Általános információk</a:t>
+            </a:r>
+            <a:endParaRPr lang="hu-HU" dirty="0"/>
+          </a:p>
+        </p:txBody>
+      </p:sp>
+      <p:pic>
+        <p:nvPicPr>
+          <p:cNvPr id="2050" name="Picture 2" descr="https://lh5.googleusercontent.com/WZhYWmuXetJLDn0zSJT-LNk7eZ0tR9sqppJnv2dKoCX4COuHxpIeDtfhLxOeUIYTSEME76Acw7CBMjsyeal9_y_pBsEISvsQ0OsjWJy_9sMqiu67_epLnKy6DKet0P0NOtDoRLRdJKAKZSwG-754Aw=s2048"/>
+          <p:cNvPicPr>
+            <a:picLocks noChangeAspect="1" noChangeArrowheads="1"/>
+          </p:cNvPicPr>
+          <p:nvPr/>
+        </p:nvPicPr>
+        <p:blipFill>
+          <a:blip r:embed="rId3">
+            <a:extLst>
+              <a:ext uri="{28A0092B-C50C-407E-A947-70E740481C1C}">
+                <a14:useLocalDpi xmlns:a14="http://schemas.microsoft.com/office/drawing/2010/main" val="0"/>
+              </a:ext>
+            </a:extLst>
+          </a:blip>
+          <a:srcRect/>
+          <a:stretch>
+            <a:fillRect/>
+          </a:stretch>
+        </p:blipFill>
+        <p:spPr bwMode="auto">
+          <a:xfrm>
+            <a:off x="1250285" y="2285897"/>
+            <a:ext cx="4844127" cy="2626238"/>
+          </a:xfrm>
+          <a:prstGeom prst="rect">
+            <a:avLst/>
+          </a:prstGeom>
+          <a:noFill/>
+          <a:extLst>
+            <a:ext uri="{909E8E84-426E-40DD-AFC4-6F175D3DCCD1}">
+              <a14:hiddenFill xmlns:a14="http://schemas.microsoft.com/office/drawing/2010/main">
+                <a:solidFill>
+                  <a:srgbClr val="FFFFFF"/>
+                </a:solidFill>
+              </a14:hiddenFill>
+            </a:ext>
+          </a:extLst>
+        </p:spPr>
+      </p:pic>
+      <p:pic>
+        <p:nvPicPr>
+          <p:cNvPr id="2052" name="Picture 4" descr="https://lh3.googleusercontent.com/ZQ7VdyWpCTRJGQ2YHJZnSf8pdAFUcsSXabK6O_oeD3VSGLn4WX7dWviyvrJ6_dHeCNvPQjjnkdN1CgagwLFDbnclYyC9HGz4CJqHEhB7RqHof-QTJmgMkVzJHodyB5oZv1N25WD9unQer2U4pY9nFg=s2048"/>
+          <p:cNvPicPr>
+            <a:picLocks noChangeAspect="1" noChangeArrowheads="1"/>
+          </p:cNvPicPr>
+          <p:nvPr/>
+        </p:nvPicPr>
+        <p:blipFill>
+          <a:blip r:embed="rId4">
+            <a:extLst>
+              <a:ext uri="{28A0092B-C50C-407E-A947-70E740481C1C}">
+                <a14:useLocalDpi xmlns:a14="http://schemas.microsoft.com/office/drawing/2010/main" val="0"/>
+              </a:ext>
+            </a:extLst>
+          </a:blip>
+          <a:srcRect/>
+          <a:stretch>
+            <a:fillRect/>
+          </a:stretch>
+        </p:blipFill>
+        <p:spPr bwMode="auto">
+          <a:xfrm>
+            <a:off x="6684961" y="2285897"/>
+            <a:ext cx="4362450" cy="2628900"/>
+          </a:xfrm>
+          <a:prstGeom prst="rect">
+            <a:avLst/>
+          </a:prstGeom>
+          <a:noFill/>
+          <a:extLst>
+            <a:ext uri="{909E8E84-426E-40DD-AFC4-6F175D3DCCD1}">
+              <a14:hiddenFill xmlns:a14="http://schemas.microsoft.com/office/drawing/2010/main">
+                <a:solidFill>
+                  <a:srgbClr val="FFFFFF"/>
+                </a:solidFill>
+              </a14:hiddenFill>
+            </a:ext>
+          </a:extLst>
+        </p:spPr>
+      </p:pic>
+    </p:spTree>
+    <p:extLst>
+      <p:ext uri="{BB962C8B-B14F-4D97-AF65-F5344CB8AC3E}">
+        <p14:creationId xmlns:p14="http://schemas.microsoft.com/office/powerpoint/2010/main" val="85270746"/>
+      </p:ext>
+    </p:extLst>
+  </p:cSld>
+  <p:clrMapOvr>
+    <a:masterClrMapping/>
+  </p:clrMapOvr>
+</p:sld>
+</file>
+
+<file path=ppt/slides/slide6.xml><?xml version="1.0" encoding="utf-8"?>
+<p:sld xmlns:a="http://schemas.openxmlformats.org/drawingml/2006/main" xmlns:r="http://schemas.openxmlformats.org/officeDocument/2006/relationships" xmlns:p="http://schemas.openxmlformats.org/presentationml/2006/main">
+  <p:cSld>
+    <p:spTree>
+      <p:nvGrpSpPr>
+        <p:cNvPr id="1" name=""/>
+        <p:cNvGrpSpPr/>
+        <p:nvPr/>
+      </p:nvGrpSpPr>
+      <p:grpSpPr>
+        <a:xfrm>
+          <a:off x="0" y="0"/>
+          <a:ext cx="0" cy="0"/>
+          <a:chOff x="0" y="0"/>
+          <a:chExt cx="0" cy="0"/>
+        </a:xfrm>
+      </p:grpSpPr>
+      <p:sp>
+        <p:nvSpPr>
+          <p:cNvPr id="2" name="Cím 1"/>
+          <p:cNvSpPr>
+            <a:spLocks noGrp="1"/>
+          </p:cNvSpPr>
+          <p:nvPr>
+            <p:ph type="title"/>
+          </p:nvPr>
+        </p:nvSpPr>
+        <p:spPr/>
+        <p:txBody>
+          <a:bodyPr/>
+          <a:lstStyle/>
+          <a:p>
+            <a:r>
               <a:rPr lang="hu-HU" dirty="0" smtClean="0">
                 <a:solidFill>
                   <a:schemeClr val="bg2">

</xml_diff>